<commit_message>
vault backup: 2024-05-14 12:42:50
</commit_message>
<xml_diff>
--- a/06-ppt/discussion/0514 - 副本.pptx
+++ b/06-ppt/discussion/0514 - 副本.pptx
@@ -1,16 +1,16 @@
 
 <file path=ppt/presentation.xml><?xml version="1.0" encoding="utf-8"?>
-<p:presentation xmlns:a="http://schemas.openxmlformats.org/drawingml/2006/main" xmlns:r="http://schemas.openxmlformats.org/officeDocument/2006/relationships" xmlns:p="http://schemas.openxmlformats.org/presentationml/2006/main" saveSubsetFonts="1">
+<p:presentation xmlns:a="http://schemas.openxmlformats.org/drawingml/2006/main" xmlns:r="http://schemas.openxmlformats.org/officeDocument/2006/relationships" xmlns:p="http://schemas.openxmlformats.org/presentationml/2006/main">
   <p:sldMasterIdLst>
     <p:sldMasterId id="2147483648" r:id="rId1"/>
   </p:sldMasterIdLst>
   <p:sldIdLst>
-    <p:sldId id="257" r:id="rId2"/>
-    <p:sldId id="260" r:id="rId3"/>
-    <p:sldId id="258" r:id="rId4"/>
-    <p:sldId id="259" r:id="rId5"/>
-    <p:sldId id="261" r:id="rId6"/>
-    <p:sldId id="262" r:id="rId7"/>
+    <p:sldId id="257" r:id="rId3"/>
+    <p:sldId id="260" r:id="rId4"/>
+    <p:sldId id="258" r:id="rId5"/>
+    <p:sldId id="259" r:id="rId6"/>
+    <p:sldId id="261" r:id="rId7"/>
+    <p:sldId id="262" r:id="rId8"/>
   </p:sldIdLst>
   <p:sldSz cx="12192000" cy="6858000"/>
   <p:notesSz cx="6858000" cy="9144000"/>
@@ -147,13 +147,7 @@
       </p:grpSpPr>
       <p:sp>
         <p:nvSpPr>
-          <p:cNvPr id="2" name="标题 1">
-            <a:extLst>
-              <a:ext uri="{FF2B5EF4-FFF2-40B4-BE49-F238E27FC236}">
-                <a16:creationId xmlns:a16="http://schemas.microsoft.com/office/drawing/2014/main" id="{D28D08F2-18F9-41EA-D82E-A457C6CB4E46}"/>
-              </a:ext>
-            </a:extLst>
-          </p:cNvPr>
+          <p:cNvPr id="2" name="标题 1"/>
           <p:cNvSpPr>
             <a:spLocks noGrp="1"/>
           </p:cNvSpPr>
@@ -179,18 +173,13 @@
               <a:rPr lang="zh-CN" altLang="en-US"/>
               <a:t>单击此处编辑母版标题样式</a:t>
             </a:r>
-          </a:p>
-        </p:txBody>
-      </p:sp>
-      <p:sp>
-        <p:nvSpPr>
-          <p:cNvPr id="3" name="副标题 2">
-            <a:extLst>
-              <a:ext uri="{FF2B5EF4-FFF2-40B4-BE49-F238E27FC236}">
-                <a16:creationId xmlns:a16="http://schemas.microsoft.com/office/drawing/2014/main" id="{588E3DC1-868F-6328-D391-83922D025AED}"/>
-              </a:ext>
-            </a:extLst>
-          </p:cNvPr>
+            <a:endParaRPr lang="zh-CN" altLang="en-US"/>
+          </a:p>
+        </p:txBody>
+      </p:sp>
+      <p:sp>
+        <p:nvSpPr>
+          <p:cNvPr id="3" name="副标题 2"/>
           <p:cNvSpPr>
             <a:spLocks noGrp="1"/>
           </p:cNvSpPr>
@@ -249,18 +238,13 @@
               <a:rPr lang="zh-CN" altLang="en-US"/>
               <a:t>单击此处编辑母版副标题样式</a:t>
             </a:r>
-          </a:p>
-        </p:txBody>
-      </p:sp>
-      <p:sp>
-        <p:nvSpPr>
-          <p:cNvPr id="4" name="日期占位符 3">
-            <a:extLst>
-              <a:ext uri="{FF2B5EF4-FFF2-40B4-BE49-F238E27FC236}">
-                <a16:creationId xmlns:a16="http://schemas.microsoft.com/office/drawing/2014/main" id="{B9F290D3-4F0A-4BA1-4D81-157967AA2244}"/>
-              </a:ext>
-            </a:extLst>
-          </p:cNvPr>
+            <a:endParaRPr lang="zh-CN" altLang="en-US"/>
+          </a:p>
+        </p:txBody>
+      </p:sp>
+      <p:sp>
+        <p:nvSpPr>
+          <p:cNvPr id="4" name="日期占位符 3"/>
           <p:cNvSpPr>
             <a:spLocks noGrp="1"/>
           </p:cNvSpPr>
@@ -275,7 +259,6 @@
           <a:p>
             <a:fld id="{5F436CC1-8A58-4025-8674-AC4643FC1143}" type="datetimeFigureOut">
               <a:rPr lang="zh-CN" altLang="en-US" smtClean="0"/>
-              <a:t>2024/5/13</a:t>
             </a:fld>
             <a:endParaRPr lang="zh-CN" altLang="en-US"/>
           </a:p>
@@ -283,13 +266,7 @@
       </p:sp>
       <p:sp>
         <p:nvSpPr>
-          <p:cNvPr id="5" name="页脚占位符 4">
-            <a:extLst>
-              <a:ext uri="{FF2B5EF4-FFF2-40B4-BE49-F238E27FC236}">
-                <a16:creationId xmlns:a16="http://schemas.microsoft.com/office/drawing/2014/main" id="{FA83A714-442E-2A26-4EC7-4CC1D88670EA}"/>
-              </a:ext>
-            </a:extLst>
-          </p:cNvPr>
+          <p:cNvPr id="5" name="页脚占位符 4"/>
           <p:cNvSpPr>
             <a:spLocks noGrp="1"/>
           </p:cNvSpPr>
@@ -308,13 +285,7 @@
       </p:sp>
       <p:sp>
         <p:nvSpPr>
-          <p:cNvPr id="6" name="灯片编号占位符 5">
-            <a:extLst>
-              <a:ext uri="{FF2B5EF4-FFF2-40B4-BE49-F238E27FC236}">
-                <a16:creationId xmlns:a16="http://schemas.microsoft.com/office/drawing/2014/main" id="{11D9443E-DF67-DCA6-428B-5AE5DB78CF33}"/>
-              </a:ext>
-            </a:extLst>
-          </p:cNvPr>
+          <p:cNvPr id="6" name="灯片编号占位符 5"/>
           <p:cNvSpPr>
             <a:spLocks noGrp="1"/>
           </p:cNvSpPr>
@@ -329,18 +300,12 @@
           <a:p>
             <a:fld id="{DC94044A-7ABA-45EB-8F13-95CB6439284F}" type="slidenum">
               <a:rPr lang="zh-CN" altLang="en-US" smtClean="0"/>
-              <a:t>‹#›</a:t>
             </a:fld>
             <a:endParaRPr lang="zh-CN" altLang="en-US"/>
           </a:p>
         </p:txBody>
       </p:sp>
     </p:spTree>
-    <p:extLst>
-      <p:ext uri="{BB962C8B-B14F-4D97-AF65-F5344CB8AC3E}">
-        <p14:creationId xmlns:p14="http://schemas.microsoft.com/office/powerpoint/2010/main" val="2510296226"/>
-      </p:ext>
-    </p:extLst>
   </p:cSld>
   <p:clrMapOvr>
     <a:masterClrMapping/>
@@ -367,13 +332,7 @@
       </p:grpSpPr>
       <p:sp>
         <p:nvSpPr>
-          <p:cNvPr id="2" name="标题 1">
-            <a:extLst>
-              <a:ext uri="{FF2B5EF4-FFF2-40B4-BE49-F238E27FC236}">
-                <a16:creationId xmlns:a16="http://schemas.microsoft.com/office/drawing/2014/main" id="{7BD3BF20-24C8-8060-5496-8ADA62748D5B}"/>
-              </a:ext>
-            </a:extLst>
-          </p:cNvPr>
+          <p:cNvPr id="2" name="标题 1"/>
           <p:cNvSpPr>
             <a:spLocks noGrp="1"/>
           </p:cNvSpPr>
@@ -390,18 +349,13 @@
               <a:rPr lang="zh-CN" altLang="en-US"/>
               <a:t>单击此处编辑母版标题样式</a:t>
             </a:r>
-          </a:p>
-        </p:txBody>
-      </p:sp>
-      <p:sp>
-        <p:nvSpPr>
-          <p:cNvPr id="3" name="竖排文字占位符 2">
-            <a:extLst>
-              <a:ext uri="{FF2B5EF4-FFF2-40B4-BE49-F238E27FC236}">
-                <a16:creationId xmlns:a16="http://schemas.microsoft.com/office/drawing/2014/main" id="{0BC770C6-7CC7-C4FA-5FD7-81E1054648B9}"/>
-              </a:ext>
-            </a:extLst>
-          </p:cNvPr>
+            <a:endParaRPr lang="zh-CN" altLang="en-US"/>
+          </a:p>
+        </p:txBody>
+      </p:sp>
+      <p:sp>
+        <p:nvSpPr>
+          <p:cNvPr id="3" name="竖排文字占位符 2"/>
           <p:cNvSpPr>
             <a:spLocks noGrp="1"/>
           </p:cNvSpPr>
@@ -419,6 +373,7 @@
               <a:rPr lang="zh-CN" altLang="en-US"/>
               <a:t>单击此处编辑母版文本样式</a:t>
             </a:r>
+            <a:endParaRPr lang="zh-CN" altLang="en-US"/>
           </a:p>
           <a:p>
             <a:pPr lvl="1"/>
@@ -426,6 +381,7 @@
               <a:rPr lang="zh-CN" altLang="en-US"/>
               <a:t>二级</a:t>
             </a:r>
+            <a:endParaRPr lang="zh-CN" altLang="en-US"/>
           </a:p>
           <a:p>
             <a:pPr lvl="2"/>
@@ -433,6 +389,7 @@
               <a:rPr lang="zh-CN" altLang="en-US"/>
               <a:t>三级</a:t>
             </a:r>
+            <a:endParaRPr lang="zh-CN" altLang="en-US"/>
           </a:p>
           <a:p>
             <a:pPr lvl="3"/>
@@ -440,6 +397,7 @@
               <a:rPr lang="zh-CN" altLang="en-US"/>
               <a:t>四级</a:t>
             </a:r>
+            <a:endParaRPr lang="zh-CN" altLang="en-US"/>
           </a:p>
           <a:p>
             <a:pPr lvl="4"/>
@@ -447,18 +405,13 @@
               <a:rPr lang="zh-CN" altLang="en-US"/>
               <a:t>五级</a:t>
             </a:r>
-          </a:p>
-        </p:txBody>
-      </p:sp>
-      <p:sp>
-        <p:nvSpPr>
-          <p:cNvPr id="4" name="日期占位符 3">
-            <a:extLst>
-              <a:ext uri="{FF2B5EF4-FFF2-40B4-BE49-F238E27FC236}">
-                <a16:creationId xmlns:a16="http://schemas.microsoft.com/office/drawing/2014/main" id="{CD6A1CB5-96C0-7161-CCED-C4418AE70195}"/>
-              </a:ext>
-            </a:extLst>
-          </p:cNvPr>
+            <a:endParaRPr lang="zh-CN" altLang="en-US"/>
+          </a:p>
+        </p:txBody>
+      </p:sp>
+      <p:sp>
+        <p:nvSpPr>
+          <p:cNvPr id="4" name="日期占位符 3"/>
           <p:cNvSpPr>
             <a:spLocks noGrp="1"/>
           </p:cNvSpPr>
@@ -473,7 +426,6 @@
           <a:p>
             <a:fld id="{5F436CC1-8A58-4025-8674-AC4643FC1143}" type="datetimeFigureOut">
               <a:rPr lang="zh-CN" altLang="en-US" smtClean="0"/>
-              <a:t>2024/5/13</a:t>
             </a:fld>
             <a:endParaRPr lang="zh-CN" altLang="en-US"/>
           </a:p>
@@ -481,13 +433,7 @@
       </p:sp>
       <p:sp>
         <p:nvSpPr>
-          <p:cNvPr id="5" name="页脚占位符 4">
-            <a:extLst>
-              <a:ext uri="{FF2B5EF4-FFF2-40B4-BE49-F238E27FC236}">
-                <a16:creationId xmlns:a16="http://schemas.microsoft.com/office/drawing/2014/main" id="{9450C94F-09C9-7A32-31A4-1E9DFF3E3629}"/>
-              </a:ext>
-            </a:extLst>
-          </p:cNvPr>
+          <p:cNvPr id="5" name="页脚占位符 4"/>
           <p:cNvSpPr>
             <a:spLocks noGrp="1"/>
           </p:cNvSpPr>
@@ -506,13 +452,7 @@
       </p:sp>
       <p:sp>
         <p:nvSpPr>
-          <p:cNvPr id="6" name="灯片编号占位符 5">
-            <a:extLst>
-              <a:ext uri="{FF2B5EF4-FFF2-40B4-BE49-F238E27FC236}">
-                <a16:creationId xmlns:a16="http://schemas.microsoft.com/office/drawing/2014/main" id="{D463D4F1-5CED-52F8-02EA-74096EDF77D9}"/>
-              </a:ext>
-            </a:extLst>
-          </p:cNvPr>
+          <p:cNvPr id="6" name="灯片编号占位符 5"/>
           <p:cNvSpPr>
             <a:spLocks noGrp="1"/>
           </p:cNvSpPr>
@@ -527,18 +467,12 @@
           <a:p>
             <a:fld id="{DC94044A-7ABA-45EB-8F13-95CB6439284F}" type="slidenum">
               <a:rPr lang="zh-CN" altLang="en-US" smtClean="0"/>
-              <a:t>‹#›</a:t>
             </a:fld>
             <a:endParaRPr lang="zh-CN" altLang="en-US"/>
           </a:p>
         </p:txBody>
       </p:sp>
     </p:spTree>
-    <p:extLst>
-      <p:ext uri="{BB962C8B-B14F-4D97-AF65-F5344CB8AC3E}">
-        <p14:creationId xmlns:p14="http://schemas.microsoft.com/office/powerpoint/2010/main" val="4187683693"/>
-      </p:ext>
-    </p:extLst>
   </p:cSld>
   <p:clrMapOvr>
     <a:masterClrMapping/>
@@ -565,13 +499,7 @@
       </p:grpSpPr>
       <p:sp>
         <p:nvSpPr>
-          <p:cNvPr id="2" name="竖排标题 1">
-            <a:extLst>
-              <a:ext uri="{FF2B5EF4-FFF2-40B4-BE49-F238E27FC236}">
-                <a16:creationId xmlns:a16="http://schemas.microsoft.com/office/drawing/2014/main" id="{605C1EDE-E8FF-5E45-33FA-6DEE3DEBB4C3}"/>
-              </a:ext>
-            </a:extLst>
-          </p:cNvPr>
+          <p:cNvPr id="2" name="竖排标题 1"/>
           <p:cNvSpPr>
             <a:spLocks noGrp="1"/>
           </p:cNvSpPr>
@@ -593,18 +521,13 @@
               <a:rPr lang="zh-CN" altLang="en-US"/>
               <a:t>单击此处编辑母版标题样式</a:t>
             </a:r>
-          </a:p>
-        </p:txBody>
-      </p:sp>
-      <p:sp>
-        <p:nvSpPr>
-          <p:cNvPr id="3" name="竖排文字占位符 2">
-            <a:extLst>
-              <a:ext uri="{FF2B5EF4-FFF2-40B4-BE49-F238E27FC236}">
-                <a16:creationId xmlns:a16="http://schemas.microsoft.com/office/drawing/2014/main" id="{CD7F7410-6B89-EF17-37A0-DFB932BD22E4}"/>
-              </a:ext>
-            </a:extLst>
-          </p:cNvPr>
+            <a:endParaRPr lang="zh-CN" altLang="en-US"/>
+          </a:p>
+        </p:txBody>
+      </p:sp>
+      <p:sp>
+        <p:nvSpPr>
+          <p:cNvPr id="3" name="竖排文字占位符 2"/>
           <p:cNvSpPr>
             <a:spLocks noGrp="1"/>
           </p:cNvSpPr>
@@ -627,6 +550,7 @@
               <a:rPr lang="zh-CN" altLang="en-US"/>
               <a:t>单击此处编辑母版文本样式</a:t>
             </a:r>
+            <a:endParaRPr lang="zh-CN" altLang="en-US"/>
           </a:p>
           <a:p>
             <a:pPr lvl="1"/>
@@ -634,6 +558,7 @@
               <a:rPr lang="zh-CN" altLang="en-US"/>
               <a:t>二级</a:t>
             </a:r>
+            <a:endParaRPr lang="zh-CN" altLang="en-US"/>
           </a:p>
           <a:p>
             <a:pPr lvl="2"/>
@@ -641,6 +566,7 @@
               <a:rPr lang="zh-CN" altLang="en-US"/>
               <a:t>三级</a:t>
             </a:r>
+            <a:endParaRPr lang="zh-CN" altLang="en-US"/>
           </a:p>
           <a:p>
             <a:pPr lvl="3"/>
@@ -648,6 +574,7 @@
               <a:rPr lang="zh-CN" altLang="en-US"/>
               <a:t>四级</a:t>
             </a:r>
+            <a:endParaRPr lang="zh-CN" altLang="en-US"/>
           </a:p>
           <a:p>
             <a:pPr lvl="4"/>
@@ -655,18 +582,13 @@
               <a:rPr lang="zh-CN" altLang="en-US"/>
               <a:t>五级</a:t>
             </a:r>
-          </a:p>
-        </p:txBody>
-      </p:sp>
-      <p:sp>
-        <p:nvSpPr>
-          <p:cNvPr id="4" name="日期占位符 3">
-            <a:extLst>
-              <a:ext uri="{FF2B5EF4-FFF2-40B4-BE49-F238E27FC236}">
-                <a16:creationId xmlns:a16="http://schemas.microsoft.com/office/drawing/2014/main" id="{60EEE1DF-28A2-9E4A-20A6-C4DAD6B0DA8B}"/>
-              </a:ext>
-            </a:extLst>
-          </p:cNvPr>
+            <a:endParaRPr lang="zh-CN" altLang="en-US"/>
+          </a:p>
+        </p:txBody>
+      </p:sp>
+      <p:sp>
+        <p:nvSpPr>
+          <p:cNvPr id="4" name="日期占位符 3"/>
           <p:cNvSpPr>
             <a:spLocks noGrp="1"/>
           </p:cNvSpPr>
@@ -681,7 +603,6 @@
           <a:p>
             <a:fld id="{5F436CC1-8A58-4025-8674-AC4643FC1143}" type="datetimeFigureOut">
               <a:rPr lang="zh-CN" altLang="en-US" smtClean="0"/>
-              <a:t>2024/5/13</a:t>
             </a:fld>
             <a:endParaRPr lang="zh-CN" altLang="en-US"/>
           </a:p>
@@ -689,13 +610,7 @@
       </p:sp>
       <p:sp>
         <p:nvSpPr>
-          <p:cNvPr id="5" name="页脚占位符 4">
-            <a:extLst>
-              <a:ext uri="{FF2B5EF4-FFF2-40B4-BE49-F238E27FC236}">
-                <a16:creationId xmlns:a16="http://schemas.microsoft.com/office/drawing/2014/main" id="{9684807D-C7B1-C494-35DB-4279A79A3B0F}"/>
-              </a:ext>
-            </a:extLst>
-          </p:cNvPr>
+          <p:cNvPr id="5" name="页脚占位符 4"/>
           <p:cNvSpPr>
             <a:spLocks noGrp="1"/>
           </p:cNvSpPr>
@@ -714,13 +629,7 @@
       </p:sp>
       <p:sp>
         <p:nvSpPr>
-          <p:cNvPr id="6" name="灯片编号占位符 5">
-            <a:extLst>
-              <a:ext uri="{FF2B5EF4-FFF2-40B4-BE49-F238E27FC236}">
-                <a16:creationId xmlns:a16="http://schemas.microsoft.com/office/drawing/2014/main" id="{C1F0EE68-EC4E-EFAC-CA6A-ECCFBDAD0A57}"/>
-              </a:ext>
-            </a:extLst>
-          </p:cNvPr>
+          <p:cNvPr id="6" name="灯片编号占位符 5"/>
           <p:cNvSpPr>
             <a:spLocks noGrp="1"/>
           </p:cNvSpPr>
@@ -735,18 +644,12 @@
           <a:p>
             <a:fld id="{DC94044A-7ABA-45EB-8F13-95CB6439284F}" type="slidenum">
               <a:rPr lang="zh-CN" altLang="en-US" smtClean="0"/>
-              <a:t>‹#›</a:t>
             </a:fld>
             <a:endParaRPr lang="zh-CN" altLang="en-US"/>
           </a:p>
         </p:txBody>
       </p:sp>
     </p:spTree>
-    <p:extLst>
-      <p:ext uri="{BB962C8B-B14F-4D97-AF65-F5344CB8AC3E}">
-        <p14:creationId xmlns:p14="http://schemas.microsoft.com/office/powerpoint/2010/main" val="1171860970"/>
-      </p:ext>
-    </p:extLst>
   </p:cSld>
   <p:clrMapOvr>
     <a:masterClrMapping/>
@@ -773,13 +676,7 @@
       </p:grpSpPr>
       <p:sp>
         <p:nvSpPr>
-          <p:cNvPr id="2" name="标题 1">
-            <a:extLst>
-              <a:ext uri="{FF2B5EF4-FFF2-40B4-BE49-F238E27FC236}">
-                <a16:creationId xmlns:a16="http://schemas.microsoft.com/office/drawing/2014/main" id="{73A2D63D-0C7F-AF67-8D00-2BA5AE82D9CB}"/>
-              </a:ext>
-            </a:extLst>
-          </p:cNvPr>
+          <p:cNvPr id="2" name="标题 1"/>
           <p:cNvSpPr>
             <a:spLocks noGrp="1"/>
           </p:cNvSpPr>
@@ -796,18 +693,13 @@
               <a:rPr lang="zh-CN" altLang="en-US"/>
               <a:t>单击此处编辑母版标题样式</a:t>
             </a:r>
-          </a:p>
-        </p:txBody>
-      </p:sp>
-      <p:sp>
-        <p:nvSpPr>
-          <p:cNvPr id="3" name="内容占位符 2">
-            <a:extLst>
-              <a:ext uri="{FF2B5EF4-FFF2-40B4-BE49-F238E27FC236}">
-                <a16:creationId xmlns:a16="http://schemas.microsoft.com/office/drawing/2014/main" id="{9BD5615F-454A-70DF-FE0C-96662A6E0CCB}"/>
-              </a:ext>
-            </a:extLst>
-          </p:cNvPr>
+            <a:endParaRPr lang="zh-CN" altLang="en-US"/>
+          </a:p>
+        </p:txBody>
+      </p:sp>
+      <p:sp>
+        <p:nvSpPr>
+          <p:cNvPr id="3" name="内容占位符 2"/>
           <p:cNvSpPr>
             <a:spLocks noGrp="1"/>
           </p:cNvSpPr>
@@ -825,6 +717,7 @@
               <a:rPr lang="zh-CN" altLang="en-US"/>
               <a:t>单击此处编辑母版文本样式</a:t>
             </a:r>
+            <a:endParaRPr lang="zh-CN" altLang="en-US"/>
           </a:p>
           <a:p>
             <a:pPr lvl="1"/>
@@ -832,6 +725,7 @@
               <a:rPr lang="zh-CN" altLang="en-US"/>
               <a:t>二级</a:t>
             </a:r>
+            <a:endParaRPr lang="zh-CN" altLang="en-US"/>
           </a:p>
           <a:p>
             <a:pPr lvl="2"/>
@@ -839,6 +733,7 @@
               <a:rPr lang="zh-CN" altLang="en-US"/>
               <a:t>三级</a:t>
             </a:r>
+            <a:endParaRPr lang="zh-CN" altLang="en-US"/>
           </a:p>
           <a:p>
             <a:pPr lvl="3"/>
@@ -846,6 +741,7 @@
               <a:rPr lang="zh-CN" altLang="en-US"/>
               <a:t>四级</a:t>
             </a:r>
+            <a:endParaRPr lang="zh-CN" altLang="en-US"/>
           </a:p>
           <a:p>
             <a:pPr lvl="4"/>
@@ -853,18 +749,13 @@
               <a:rPr lang="zh-CN" altLang="en-US"/>
               <a:t>五级</a:t>
             </a:r>
-          </a:p>
-        </p:txBody>
-      </p:sp>
-      <p:sp>
-        <p:nvSpPr>
-          <p:cNvPr id="4" name="日期占位符 3">
-            <a:extLst>
-              <a:ext uri="{FF2B5EF4-FFF2-40B4-BE49-F238E27FC236}">
-                <a16:creationId xmlns:a16="http://schemas.microsoft.com/office/drawing/2014/main" id="{13D43111-4604-5EA0-E171-B6C38C23C415}"/>
-              </a:ext>
-            </a:extLst>
-          </p:cNvPr>
+            <a:endParaRPr lang="zh-CN" altLang="en-US"/>
+          </a:p>
+        </p:txBody>
+      </p:sp>
+      <p:sp>
+        <p:nvSpPr>
+          <p:cNvPr id="4" name="日期占位符 3"/>
           <p:cNvSpPr>
             <a:spLocks noGrp="1"/>
           </p:cNvSpPr>
@@ -879,7 +770,6 @@
           <a:p>
             <a:fld id="{5F436CC1-8A58-4025-8674-AC4643FC1143}" type="datetimeFigureOut">
               <a:rPr lang="zh-CN" altLang="en-US" smtClean="0"/>
-              <a:t>2024/5/13</a:t>
             </a:fld>
             <a:endParaRPr lang="zh-CN" altLang="en-US"/>
           </a:p>
@@ -887,13 +777,7 @@
       </p:sp>
       <p:sp>
         <p:nvSpPr>
-          <p:cNvPr id="5" name="页脚占位符 4">
-            <a:extLst>
-              <a:ext uri="{FF2B5EF4-FFF2-40B4-BE49-F238E27FC236}">
-                <a16:creationId xmlns:a16="http://schemas.microsoft.com/office/drawing/2014/main" id="{E399592E-A839-39C5-4FF1-E13931CC62E1}"/>
-              </a:ext>
-            </a:extLst>
-          </p:cNvPr>
+          <p:cNvPr id="5" name="页脚占位符 4"/>
           <p:cNvSpPr>
             <a:spLocks noGrp="1"/>
           </p:cNvSpPr>
@@ -912,13 +796,7 @@
       </p:sp>
       <p:sp>
         <p:nvSpPr>
-          <p:cNvPr id="6" name="灯片编号占位符 5">
-            <a:extLst>
-              <a:ext uri="{FF2B5EF4-FFF2-40B4-BE49-F238E27FC236}">
-                <a16:creationId xmlns:a16="http://schemas.microsoft.com/office/drawing/2014/main" id="{0B0B51D1-3D6D-6E85-976E-ED7DF5573980}"/>
-              </a:ext>
-            </a:extLst>
-          </p:cNvPr>
+          <p:cNvPr id="6" name="灯片编号占位符 5"/>
           <p:cNvSpPr>
             <a:spLocks noGrp="1"/>
           </p:cNvSpPr>
@@ -933,18 +811,12 @@
           <a:p>
             <a:fld id="{DC94044A-7ABA-45EB-8F13-95CB6439284F}" type="slidenum">
               <a:rPr lang="zh-CN" altLang="en-US" smtClean="0"/>
-              <a:t>‹#›</a:t>
             </a:fld>
             <a:endParaRPr lang="zh-CN" altLang="en-US"/>
           </a:p>
         </p:txBody>
       </p:sp>
     </p:spTree>
-    <p:extLst>
-      <p:ext uri="{BB962C8B-B14F-4D97-AF65-F5344CB8AC3E}">
-        <p14:creationId xmlns:p14="http://schemas.microsoft.com/office/powerpoint/2010/main" val="1457202820"/>
-      </p:ext>
-    </p:extLst>
   </p:cSld>
   <p:clrMapOvr>
     <a:masterClrMapping/>
@@ -971,13 +843,7 @@
       </p:grpSpPr>
       <p:sp>
         <p:nvSpPr>
-          <p:cNvPr id="2" name="标题 1">
-            <a:extLst>
-              <a:ext uri="{FF2B5EF4-FFF2-40B4-BE49-F238E27FC236}">
-                <a16:creationId xmlns:a16="http://schemas.microsoft.com/office/drawing/2014/main" id="{FC731476-80DD-7EEB-6AE0-57D753565EDD}"/>
-              </a:ext>
-            </a:extLst>
-          </p:cNvPr>
+          <p:cNvPr id="2" name="标题 1"/>
           <p:cNvSpPr>
             <a:spLocks noGrp="1"/>
           </p:cNvSpPr>
@@ -1003,18 +869,13 @@
               <a:rPr lang="zh-CN" altLang="en-US"/>
               <a:t>单击此处编辑母版标题样式</a:t>
             </a:r>
-          </a:p>
-        </p:txBody>
-      </p:sp>
-      <p:sp>
-        <p:nvSpPr>
-          <p:cNvPr id="3" name="文本占位符 2">
-            <a:extLst>
-              <a:ext uri="{FF2B5EF4-FFF2-40B4-BE49-F238E27FC236}">
-                <a16:creationId xmlns:a16="http://schemas.microsoft.com/office/drawing/2014/main" id="{827D7933-28EF-D2E9-9ADC-6ECB471442C3}"/>
-              </a:ext>
-            </a:extLst>
-          </p:cNvPr>
+            <a:endParaRPr lang="zh-CN" altLang="en-US"/>
+          </a:p>
+        </p:txBody>
+      </p:sp>
+      <p:sp>
+        <p:nvSpPr>
+          <p:cNvPr id="3" name="文本占位符 2"/>
           <p:cNvSpPr>
             <a:spLocks noGrp="1"/>
           </p:cNvSpPr>
@@ -1128,18 +989,13 @@
               <a:rPr lang="zh-CN" altLang="en-US"/>
               <a:t>单击此处编辑母版文本样式</a:t>
             </a:r>
-          </a:p>
-        </p:txBody>
-      </p:sp>
-      <p:sp>
-        <p:nvSpPr>
-          <p:cNvPr id="4" name="日期占位符 3">
-            <a:extLst>
-              <a:ext uri="{FF2B5EF4-FFF2-40B4-BE49-F238E27FC236}">
-                <a16:creationId xmlns:a16="http://schemas.microsoft.com/office/drawing/2014/main" id="{E765E614-309F-BC12-2405-BD87644E9C90}"/>
-              </a:ext>
-            </a:extLst>
-          </p:cNvPr>
+            <a:endParaRPr lang="zh-CN" altLang="en-US"/>
+          </a:p>
+        </p:txBody>
+      </p:sp>
+      <p:sp>
+        <p:nvSpPr>
+          <p:cNvPr id="4" name="日期占位符 3"/>
           <p:cNvSpPr>
             <a:spLocks noGrp="1"/>
           </p:cNvSpPr>
@@ -1154,7 +1010,6 @@
           <a:p>
             <a:fld id="{5F436CC1-8A58-4025-8674-AC4643FC1143}" type="datetimeFigureOut">
               <a:rPr lang="zh-CN" altLang="en-US" smtClean="0"/>
-              <a:t>2024/5/13</a:t>
             </a:fld>
             <a:endParaRPr lang="zh-CN" altLang="en-US"/>
           </a:p>
@@ -1162,13 +1017,7 @@
       </p:sp>
       <p:sp>
         <p:nvSpPr>
-          <p:cNvPr id="5" name="页脚占位符 4">
-            <a:extLst>
-              <a:ext uri="{FF2B5EF4-FFF2-40B4-BE49-F238E27FC236}">
-                <a16:creationId xmlns:a16="http://schemas.microsoft.com/office/drawing/2014/main" id="{30DA384D-CD48-AF8C-1314-B5FE31E2436F}"/>
-              </a:ext>
-            </a:extLst>
-          </p:cNvPr>
+          <p:cNvPr id="5" name="页脚占位符 4"/>
           <p:cNvSpPr>
             <a:spLocks noGrp="1"/>
           </p:cNvSpPr>
@@ -1187,13 +1036,7 @@
       </p:sp>
       <p:sp>
         <p:nvSpPr>
-          <p:cNvPr id="6" name="灯片编号占位符 5">
-            <a:extLst>
-              <a:ext uri="{FF2B5EF4-FFF2-40B4-BE49-F238E27FC236}">
-                <a16:creationId xmlns:a16="http://schemas.microsoft.com/office/drawing/2014/main" id="{2FE4B15E-BC5D-E18D-36BC-C902D168AEB7}"/>
-              </a:ext>
-            </a:extLst>
-          </p:cNvPr>
+          <p:cNvPr id="6" name="灯片编号占位符 5"/>
           <p:cNvSpPr>
             <a:spLocks noGrp="1"/>
           </p:cNvSpPr>
@@ -1208,18 +1051,12 @@
           <a:p>
             <a:fld id="{DC94044A-7ABA-45EB-8F13-95CB6439284F}" type="slidenum">
               <a:rPr lang="zh-CN" altLang="en-US" smtClean="0"/>
-              <a:t>‹#›</a:t>
             </a:fld>
             <a:endParaRPr lang="zh-CN" altLang="en-US"/>
           </a:p>
         </p:txBody>
       </p:sp>
     </p:spTree>
-    <p:extLst>
-      <p:ext uri="{BB962C8B-B14F-4D97-AF65-F5344CB8AC3E}">
-        <p14:creationId xmlns:p14="http://schemas.microsoft.com/office/powerpoint/2010/main" val="2106136757"/>
-      </p:ext>
-    </p:extLst>
   </p:cSld>
   <p:clrMapOvr>
     <a:masterClrMapping/>
@@ -1246,13 +1083,7 @@
       </p:grpSpPr>
       <p:sp>
         <p:nvSpPr>
-          <p:cNvPr id="2" name="标题 1">
-            <a:extLst>
-              <a:ext uri="{FF2B5EF4-FFF2-40B4-BE49-F238E27FC236}">
-                <a16:creationId xmlns:a16="http://schemas.microsoft.com/office/drawing/2014/main" id="{A222110B-735F-C3D7-622C-38B407B68555}"/>
-              </a:ext>
-            </a:extLst>
-          </p:cNvPr>
+          <p:cNvPr id="2" name="标题 1"/>
           <p:cNvSpPr>
             <a:spLocks noGrp="1"/>
           </p:cNvSpPr>
@@ -1269,18 +1100,13 @@
               <a:rPr lang="zh-CN" altLang="en-US"/>
               <a:t>单击此处编辑母版标题样式</a:t>
             </a:r>
-          </a:p>
-        </p:txBody>
-      </p:sp>
-      <p:sp>
-        <p:nvSpPr>
-          <p:cNvPr id="3" name="内容占位符 2">
-            <a:extLst>
-              <a:ext uri="{FF2B5EF4-FFF2-40B4-BE49-F238E27FC236}">
-                <a16:creationId xmlns:a16="http://schemas.microsoft.com/office/drawing/2014/main" id="{0DAD97D8-B235-02C8-A2B8-ED8E685D097E}"/>
-              </a:ext>
-            </a:extLst>
-          </p:cNvPr>
+            <a:endParaRPr lang="zh-CN" altLang="en-US"/>
+          </a:p>
+        </p:txBody>
+      </p:sp>
+      <p:sp>
+        <p:nvSpPr>
+          <p:cNvPr id="3" name="内容占位符 2"/>
           <p:cNvSpPr>
             <a:spLocks noGrp="1"/>
           </p:cNvSpPr>
@@ -1303,6 +1129,7 @@
               <a:rPr lang="zh-CN" altLang="en-US"/>
               <a:t>单击此处编辑母版文本样式</a:t>
             </a:r>
+            <a:endParaRPr lang="zh-CN" altLang="en-US"/>
           </a:p>
           <a:p>
             <a:pPr lvl="1"/>
@@ -1310,6 +1137,7 @@
               <a:rPr lang="zh-CN" altLang="en-US"/>
               <a:t>二级</a:t>
             </a:r>
+            <a:endParaRPr lang="zh-CN" altLang="en-US"/>
           </a:p>
           <a:p>
             <a:pPr lvl="2"/>
@@ -1317,6 +1145,7 @@
               <a:rPr lang="zh-CN" altLang="en-US"/>
               <a:t>三级</a:t>
             </a:r>
+            <a:endParaRPr lang="zh-CN" altLang="en-US"/>
           </a:p>
           <a:p>
             <a:pPr lvl="3"/>
@@ -1324,6 +1153,7 @@
               <a:rPr lang="zh-CN" altLang="en-US"/>
               <a:t>四级</a:t>
             </a:r>
+            <a:endParaRPr lang="zh-CN" altLang="en-US"/>
           </a:p>
           <a:p>
             <a:pPr lvl="4"/>
@@ -1331,18 +1161,13 @@
               <a:rPr lang="zh-CN" altLang="en-US"/>
               <a:t>五级</a:t>
             </a:r>
-          </a:p>
-        </p:txBody>
-      </p:sp>
-      <p:sp>
-        <p:nvSpPr>
-          <p:cNvPr id="4" name="内容占位符 3">
-            <a:extLst>
-              <a:ext uri="{FF2B5EF4-FFF2-40B4-BE49-F238E27FC236}">
-                <a16:creationId xmlns:a16="http://schemas.microsoft.com/office/drawing/2014/main" id="{D3A33469-EC23-BBF9-BFF5-CDA2DD47EA21}"/>
-              </a:ext>
-            </a:extLst>
-          </p:cNvPr>
+            <a:endParaRPr lang="zh-CN" altLang="en-US"/>
+          </a:p>
+        </p:txBody>
+      </p:sp>
+      <p:sp>
+        <p:nvSpPr>
+          <p:cNvPr id="4" name="内容占位符 3"/>
           <p:cNvSpPr>
             <a:spLocks noGrp="1"/>
           </p:cNvSpPr>
@@ -1365,6 +1190,7 @@
               <a:rPr lang="zh-CN" altLang="en-US"/>
               <a:t>单击此处编辑母版文本样式</a:t>
             </a:r>
+            <a:endParaRPr lang="zh-CN" altLang="en-US"/>
           </a:p>
           <a:p>
             <a:pPr lvl="1"/>
@@ -1372,6 +1198,7 @@
               <a:rPr lang="zh-CN" altLang="en-US"/>
               <a:t>二级</a:t>
             </a:r>
+            <a:endParaRPr lang="zh-CN" altLang="en-US"/>
           </a:p>
           <a:p>
             <a:pPr lvl="2"/>
@@ -1379,6 +1206,7 @@
               <a:rPr lang="zh-CN" altLang="en-US"/>
               <a:t>三级</a:t>
             </a:r>
+            <a:endParaRPr lang="zh-CN" altLang="en-US"/>
           </a:p>
           <a:p>
             <a:pPr lvl="3"/>
@@ -1386,6 +1214,7 @@
               <a:rPr lang="zh-CN" altLang="en-US"/>
               <a:t>四级</a:t>
             </a:r>
+            <a:endParaRPr lang="zh-CN" altLang="en-US"/>
           </a:p>
           <a:p>
             <a:pPr lvl="4"/>
@@ -1393,18 +1222,13 @@
               <a:rPr lang="zh-CN" altLang="en-US"/>
               <a:t>五级</a:t>
             </a:r>
-          </a:p>
-        </p:txBody>
-      </p:sp>
-      <p:sp>
-        <p:nvSpPr>
-          <p:cNvPr id="5" name="日期占位符 4">
-            <a:extLst>
-              <a:ext uri="{FF2B5EF4-FFF2-40B4-BE49-F238E27FC236}">
-                <a16:creationId xmlns:a16="http://schemas.microsoft.com/office/drawing/2014/main" id="{9AED5917-2742-2AD1-9DEB-F77CC671108A}"/>
-              </a:ext>
-            </a:extLst>
-          </p:cNvPr>
+            <a:endParaRPr lang="zh-CN" altLang="en-US"/>
+          </a:p>
+        </p:txBody>
+      </p:sp>
+      <p:sp>
+        <p:nvSpPr>
+          <p:cNvPr id="5" name="日期占位符 4"/>
           <p:cNvSpPr>
             <a:spLocks noGrp="1"/>
           </p:cNvSpPr>
@@ -1419,7 +1243,6 @@
           <a:p>
             <a:fld id="{5F436CC1-8A58-4025-8674-AC4643FC1143}" type="datetimeFigureOut">
               <a:rPr lang="zh-CN" altLang="en-US" smtClean="0"/>
-              <a:t>2024/5/13</a:t>
             </a:fld>
             <a:endParaRPr lang="zh-CN" altLang="en-US"/>
           </a:p>
@@ -1427,13 +1250,7 @@
       </p:sp>
       <p:sp>
         <p:nvSpPr>
-          <p:cNvPr id="6" name="页脚占位符 5">
-            <a:extLst>
-              <a:ext uri="{FF2B5EF4-FFF2-40B4-BE49-F238E27FC236}">
-                <a16:creationId xmlns:a16="http://schemas.microsoft.com/office/drawing/2014/main" id="{1B34464E-9A03-5B34-C0F6-C5BC5BA942E2}"/>
-              </a:ext>
-            </a:extLst>
-          </p:cNvPr>
+          <p:cNvPr id="6" name="页脚占位符 5"/>
           <p:cNvSpPr>
             <a:spLocks noGrp="1"/>
           </p:cNvSpPr>
@@ -1452,13 +1269,7 @@
       </p:sp>
       <p:sp>
         <p:nvSpPr>
-          <p:cNvPr id="7" name="灯片编号占位符 6">
-            <a:extLst>
-              <a:ext uri="{FF2B5EF4-FFF2-40B4-BE49-F238E27FC236}">
-                <a16:creationId xmlns:a16="http://schemas.microsoft.com/office/drawing/2014/main" id="{BBD26416-96E9-312E-53B5-DE06E68397F4}"/>
-              </a:ext>
-            </a:extLst>
-          </p:cNvPr>
+          <p:cNvPr id="7" name="灯片编号占位符 6"/>
           <p:cNvSpPr>
             <a:spLocks noGrp="1"/>
           </p:cNvSpPr>
@@ -1473,18 +1284,12 @@
           <a:p>
             <a:fld id="{DC94044A-7ABA-45EB-8F13-95CB6439284F}" type="slidenum">
               <a:rPr lang="zh-CN" altLang="en-US" smtClean="0"/>
-              <a:t>‹#›</a:t>
             </a:fld>
             <a:endParaRPr lang="zh-CN" altLang="en-US"/>
           </a:p>
         </p:txBody>
       </p:sp>
     </p:spTree>
-    <p:extLst>
-      <p:ext uri="{BB962C8B-B14F-4D97-AF65-F5344CB8AC3E}">
-        <p14:creationId xmlns:p14="http://schemas.microsoft.com/office/powerpoint/2010/main" val="1197497853"/>
-      </p:ext>
-    </p:extLst>
   </p:cSld>
   <p:clrMapOvr>
     <a:masterClrMapping/>
@@ -1511,13 +1316,7 @@
       </p:grpSpPr>
       <p:sp>
         <p:nvSpPr>
-          <p:cNvPr id="2" name="标题 1">
-            <a:extLst>
-              <a:ext uri="{FF2B5EF4-FFF2-40B4-BE49-F238E27FC236}">
-                <a16:creationId xmlns:a16="http://schemas.microsoft.com/office/drawing/2014/main" id="{A5AB2EF9-4C99-6FFE-79D9-11246E5132B0}"/>
-              </a:ext>
-            </a:extLst>
-          </p:cNvPr>
+          <p:cNvPr id="2" name="标题 1"/>
           <p:cNvSpPr>
             <a:spLocks noGrp="1"/>
           </p:cNvSpPr>
@@ -1539,18 +1338,13 @@
               <a:rPr lang="zh-CN" altLang="en-US"/>
               <a:t>单击此处编辑母版标题样式</a:t>
             </a:r>
-          </a:p>
-        </p:txBody>
-      </p:sp>
-      <p:sp>
-        <p:nvSpPr>
-          <p:cNvPr id="3" name="文本占位符 2">
-            <a:extLst>
-              <a:ext uri="{FF2B5EF4-FFF2-40B4-BE49-F238E27FC236}">
-                <a16:creationId xmlns:a16="http://schemas.microsoft.com/office/drawing/2014/main" id="{12AD73BC-77D3-EBDF-62C2-74145A123BE1}"/>
-              </a:ext>
-            </a:extLst>
-          </p:cNvPr>
+            <a:endParaRPr lang="zh-CN" altLang="en-US"/>
+          </a:p>
+        </p:txBody>
+      </p:sp>
+      <p:sp>
+        <p:nvSpPr>
+          <p:cNvPr id="3" name="文本占位符 2"/>
           <p:cNvSpPr>
             <a:spLocks noGrp="1"/>
           </p:cNvSpPr>
@@ -1610,18 +1404,13 @@
               <a:rPr lang="zh-CN" altLang="en-US"/>
               <a:t>单击此处编辑母版文本样式</a:t>
             </a:r>
-          </a:p>
-        </p:txBody>
-      </p:sp>
-      <p:sp>
-        <p:nvSpPr>
-          <p:cNvPr id="4" name="内容占位符 3">
-            <a:extLst>
-              <a:ext uri="{FF2B5EF4-FFF2-40B4-BE49-F238E27FC236}">
-                <a16:creationId xmlns:a16="http://schemas.microsoft.com/office/drawing/2014/main" id="{068CBBC7-16DD-3C35-CC90-1E90D7E355CC}"/>
-              </a:ext>
-            </a:extLst>
-          </p:cNvPr>
+            <a:endParaRPr lang="zh-CN" altLang="en-US"/>
+          </a:p>
+        </p:txBody>
+      </p:sp>
+      <p:sp>
+        <p:nvSpPr>
+          <p:cNvPr id="4" name="内容占位符 3"/>
           <p:cNvSpPr>
             <a:spLocks noGrp="1"/>
           </p:cNvSpPr>
@@ -1644,6 +1433,7 @@
               <a:rPr lang="zh-CN" altLang="en-US"/>
               <a:t>单击此处编辑母版文本样式</a:t>
             </a:r>
+            <a:endParaRPr lang="zh-CN" altLang="en-US"/>
           </a:p>
           <a:p>
             <a:pPr lvl="1"/>
@@ -1651,6 +1441,7 @@
               <a:rPr lang="zh-CN" altLang="en-US"/>
               <a:t>二级</a:t>
             </a:r>
+            <a:endParaRPr lang="zh-CN" altLang="en-US"/>
           </a:p>
           <a:p>
             <a:pPr lvl="2"/>
@@ -1658,6 +1449,7 @@
               <a:rPr lang="zh-CN" altLang="en-US"/>
               <a:t>三级</a:t>
             </a:r>
+            <a:endParaRPr lang="zh-CN" altLang="en-US"/>
           </a:p>
           <a:p>
             <a:pPr lvl="3"/>
@@ -1665,6 +1457,7 @@
               <a:rPr lang="zh-CN" altLang="en-US"/>
               <a:t>四级</a:t>
             </a:r>
+            <a:endParaRPr lang="zh-CN" altLang="en-US"/>
           </a:p>
           <a:p>
             <a:pPr lvl="4"/>
@@ -1672,18 +1465,13 @@
               <a:rPr lang="zh-CN" altLang="en-US"/>
               <a:t>五级</a:t>
             </a:r>
-          </a:p>
-        </p:txBody>
-      </p:sp>
-      <p:sp>
-        <p:nvSpPr>
-          <p:cNvPr id="5" name="文本占位符 4">
-            <a:extLst>
-              <a:ext uri="{FF2B5EF4-FFF2-40B4-BE49-F238E27FC236}">
-                <a16:creationId xmlns:a16="http://schemas.microsoft.com/office/drawing/2014/main" id="{48B057CE-301F-F06B-7A67-D83403CB0528}"/>
-              </a:ext>
-            </a:extLst>
-          </p:cNvPr>
+            <a:endParaRPr lang="zh-CN" altLang="en-US"/>
+          </a:p>
+        </p:txBody>
+      </p:sp>
+      <p:sp>
+        <p:nvSpPr>
+          <p:cNvPr id="5" name="文本占位符 4"/>
           <p:cNvSpPr>
             <a:spLocks noGrp="1"/>
           </p:cNvSpPr>
@@ -1743,18 +1531,13 @@
               <a:rPr lang="zh-CN" altLang="en-US"/>
               <a:t>单击此处编辑母版文本样式</a:t>
             </a:r>
-          </a:p>
-        </p:txBody>
-      </p:sp>
-      <p:sp>
-        <p:nvSpPr>
-          <p:cNvPr id="6" name="内容占位符 5">
-            <a:extLst>
-              <a:ext uri="{FF2B5EF4-FFF2-40B4-BE49-F238E27FC236}">
-                <a16:creationId xmlns:a16="http://schemas.microsoft.com/office/drawing/2014/main" id="{390EF25E-DEFC-7469-8E92-FB94D86BE99D}"/>
-              </a:ext>
-            </a:extLst>
-          </p:cNvPr>
+            <a:endParaRPr lang="zh-CN" altLang="en-US"/>
+          </a:p>
+        </p:txBody>
+      </p:sp>
+      <p:sp>
+        <p:nvSpPr>
+          <p:cNvPr id="6" name="内容占位符 5"/>
           <p:cNvSpPr>
             <a:spLocks noGrp="1"/>
           </p:cNvSpPr>
@@ -1777,6 +1560,7 @@
               <a:rPr lang="zh-CN" altLang="en-US"/>
               <a:t>单击此处编辑母版文本样式</a:t>
             </a:r>
+            <a:endParaRPr lang="zh-CN" altLang="en-US"/>
           </a:p>
           <a:p>
             <a:pPr lvl="1"/>
@@ -1784,6 +1568,7 @@
               <a:rPr lang="zh-CN" altLang="en-US"/>
               <a:t>二级</a:t>
             </a:r>
+            <a:endParaRPr lang="zh-CN" altLang="en-US"/>
           </a:p>
           <a:p>
             <a:pPr lvl="2"/>
@@ -1791,6 +1576,7 @@
               <a:rPr lang="zh-CN" altLang="en-US"/>
               <a:t>三级</a:t>
             </a:r>
+            <a:endParaRPr lang="zh-CN" altLang="en-US"/>
           </a:p>
           <a:p>
             <a:pPr lvl="3"/>
@@ -1798,6 +1584,7 @@
               <a:rPr lang="zh-CN" altLang="en-US"/>
               <a:t>四级</a:t>
             </a:r>
+            <a:endParaRPr lang="zh-CN" altLang="en-US"/>
           </a:p>
           <a:p>
             <a:pPr lvl="4"/>
@@ -1805,18 +1592,13 @@
               <a:rPr lang="zh-CN" altLang="en-US"/>
               <a:t>五级</a:t>
             </a:r>
-          </a:p>
-        </p:txBody>
-      </p:sp>
-      <p:sp>
-        <p:nvSpPr>
-          <p:cNvPr id="7" name="日期占位符 6">
-            <a:extLst>
-              <a:ext uri="{FF2B5EF4-FFF2-40B4-BE49-F238E27FC236}">
-                <a16:creationId xmlns:a16="http://schemas.microsoft.com/office/drawing/2014/main" id="{C43CBC23-06D9-5BCF-3F21-970B621613B8}"/>
-              </a:ext>
-            </a:extLst>
-          </p:cNvPr>
+            <a:endParaRPr lang="zh-CN" altLang="en-US"/>
+          </a:p>
+        </p:txBody>
+      </p:sp>
+      <p:sp>
+        <p:nvSpPr>
+          <p:cNvPr id="7" name="日期占位符 6"/>
           <p:cNvSpPr>
             <a:spLocks noGrp="1"/>
           </p:cNvSpPr>
@@ -1831,7 +1613,6 @@
           <a:p>
             <a:fld id="{5F436CC1-8A58-4025-8674-AC4643FC1143}" type="datetimeFigureOut">
               <a:rPr lang="zh-CN" altLang="en-US" smtClean="0"/>
-              <a:t>2024/5/13</a:t>
             </a:fld>
             <a:endParaRPr lang="zh-CN" altLang="en-US"/>
           </a:p>
@@ -1839,13 +1620,7 @@
       </p:sp>
       <p:sp>
         <p:nvSpPr>
-          <p:cNvPr id="8" name="页脚占位符 7">
-            <a:extLst>
-              <a:ext uri="{FF2B5EF4-FFF2-40B4-BE49-F238E27FC236}">
-                <a16:creationId xmlns:a16="http://schemas.microsoft.com/office/drawing/2014/main" id="{86795DE7-5DE0-1322-295B-F99F079C35B1}"/>
-              </a:ext>
-            </a:extLst>
-          </p:cNvPr>
+          <p:cNvPr id="8" name="页脚占位符 7"/>
           <p:cNvSpPr>
             <a:spLocks noGrp="1"/>
           </p:cNvSpPr>
@@ -1864,13 +1639,7 @@
       </p:sp>
       <p:sp>
         <p:nvSpPr>
-          <p:cNvPr id="9" name="灯片编号占位符 8">
-            <a:extLst>
-              <a:ext uri="{FF2B5EF4-FFF2-40B4-BE49-F238E27FC236}">
-                <a16:creationId xmlns:a16="http://schemas.microsoft.com/office/drawing/2014/main" id="{3749FA8A-ABC6-708C-09AE-242AD638AB14}"/>
-              </a:ext>
-            </a:extLst>
-          </p:cNvPr>
+          <p:cNvPr id="9" name="灯片编号占位符 8"/>
           <p:cNvSpPr>
             <a:spLocks noGrp="1"/>
           </p:cNvSpPr>
@@ -1885,18 +1654,12 @@
           <a:p>
             <a:fld id="{DC94044A-7ABA-45EB-8F13-95CB6439284F}" type="slidenum">
               <a:rPr lang="zh-CN" altLang="en-US" smtClean="0"/>
-              <a:t>‹#›</a:t>
             </a:fld>
             <a:endParaRPr lang="zh-CN" altLang="en-US"/>
           </a:p>
         </p:txBody>
       </p:sp>
     </p:spTree>
-    <p:extLst>
-      <p:ext uri="{BB962C8B-B14F-4D97-AF65-F5344CB8AC3E}">
-        <p14:creationId xmlns:p14="http://schemas.microsoft.com/office/powerpoint/2010/main" val="999906011"/>
-      </p:ext>
-    </p:extLst>
   </p:cSld>
   <p:clrMapOvr>
     <a:masterClrMapping/>
@@ -1923,13 +1686,7 @@
       </p:grpSpPr>
       <p:sp>
         <p:nvSpPr>
-          <p:cNvPr id="2" name="标题 1">
-            <a:extLst>
-              <a:ext uri="{FF2B5EF4-FFF2-40B4-BE49-F238E27FC236}">
-                <a16:creationId xmlns:a16="http://schemas.microsoft.com/office/drawing/2014/main" id="{8534757B-E810-7AE5-DDCE-2B2F822D2C2E}"/>
-              </a:ext>
-            </a:extLst>
-          </p:cNvPr>
+          <p:cNvPr id="2" name="标题 1"/>
           <p:cNvSpPr>
             <a:spLocks noGrp="1"/>
           </p:cNvSpPr>
@@ -1946,18 +1703,13 @@
               <a:rPr lang="zh-CN" altLang="en-US"/>
               <a:t>单击此处编辑母版标题样式</a:t>
             </a:r>
-          </a:p>
-        </p:txBody>
-      </p:sp>
-      <p:sp>
-        <p:nvSpPr>
-          <p:cNvPr id="3" name="日期占位符 2">
-            <a:extLst>
-              <a:ext uri="{FF2B5EF4-FFF2-40B4-BE49-F238E27FC236}">
-                <a16:creationId xmlns:a16="http://schemas.microsoft.com/office/drawing/2014/main" id="{6B289D07-979F-4FC1-481E-0A31A6E5AEB0}"/>
-              </a:ext>
-            </a:extLst>
-          </p:cNvPr>
+            <a:endParaRPr lang="zh-CN" altLang="en-US"/>
+          </a:p>
+        </p:txBody>
+      </p:sp>
+      <p:sp>
+        <p:nvSpPr>
+          <p:cNvPr id="3" name="日期占位符 2"/>
           <p:cNvSpPr>
             <a:spLocks noGrp="1"/>
           </p:cNvSpPr>
@@ -1972,7 +1724,6 @@
           <a:p>
             <a:fld id="{5F436CC1-8A58-4025-8674-AC4643FC1143}" type="datetimeFigureOut">
               <a:rPr lang="zh-CN" altLang="en-US" smtClean="0"/>
-              <a:t>2024/5/13</a:t>
             </a:fld>
             <a:endParaRPr lang="zh-CN" altLang="en-US"/>
           </a:p>
@@ -1980,13 +1731,7 @@
       </p:sp>
       <p:sp>
         <p:nvSpPr>
-          <p:cNvPr id="4" name="页脚占位符 3">
-            <a:extLst>
-              <a:ext uri="{FF2B5EF4-FFF2-40B4-BE49-F238E27FC236}">
-                <a16:creationId xmlns:a16="http://schemas.microsoft.com/office/drawing/2014/main" id="{398E221E-81C1-AF9C-6B9C-902E0E5A70E4}"/>
-              </a:ext>
-            </a:extLst>
-          </p:cNvPr>
+          <p:cNvPr id="4" name="页脚占位符 3"/>
           <p:cNvSpPr>
             <a:spLocks noGrp="1"/>
           </p:cNvSpPr>
@@ -2005,13 +1750,7 @@
       </p:sp>
       <p:sp>
         <p:nvSpPr>
-          <p:cNvPr id="5" name="灯片编号占位符 4">
-            <a:extLst>
-              <a:ext uri="{FF2B5EF4-FFF2-40B4-BE49-F238E27FC236}">
-                <a16:creationId xmlns:a16="http://schemas.microsoft.com/office/drawing/2014/main" id="{EA20DE4F-7F0B-1D53-AEB3-07A97021D393}"/>
-              </a:ext>
-            </a:extLst>
-          </p:cNvPr>
+          <p:cNvPr id="5" name="灯片编号占位符 4"/>
           <p:cNvSpPr>
             <a:spLocks noGrp="1"/>
           </p:cNvSpPr>
@@ -2026,18 +1765,12 @@
           <a:p>
             <a:fld id="{DC94044A-7ABA-45EB-8F13-95CB6439284F}" type="slidenum">
               <a:rPr lang="zh-CN" altLang="en-US" smtClean="0"/>
-              <a:t>‹#›</a:t>
             </a:fld>
             <a:endParaRPr lang="zh-CN" altLang="en-US"/>
           </a:p>
         </p:txBody>
       </p:sp>
     </p:spTree>
-    <p:extLst>
-      <p:ext uri="{BB962C8B-B14F-4D97-AF65-F5344CB8AC3E}">
-        <p14:creationId xmlns:p14="http://schemas.microsoft.com/office/powerpoint/2010/main" val="2755432995"/>
-      </p:ext>
-    </p:extLst>
   </p:cSld>
   <p:clrMapOvr>
     <a:masterClrMapping/>
@@ -2064,13 +1797,7 @@
       </p:grpSpPr>
       <p:sp>
         <p:nvSpPr>
-          <p:cNvPr id="2" name="日期占位符 1">
-            <a:extLst>
-              <a:ext uri="{FF2B5EF4-FFF2-40B4-BE49-F238E27FC236}">
-                <a16:creationId xmlns:a16="http://schemas.microsoft.com/office/drawing/2014/main" id="{AE7502EC-4D1E-7548-50FA-37D2944C8C58}"/>
-              </a:ext>
-            </a:extLst>
-          </p:cNvPr>
+          <p:cNvPr id="2" name="日期占位符 1"/>
           <p:cNvSpPr>
             <a:spLocks noGrp="1"/>
           </p:cNvSpPr>
@@ -2085,7 +1812,6 @@
           <a:p>
             <a:fld id="{5F436CC1-8A58-4025-8674-AC4643FC1143}" type="datetimeFigureOut">
               <a:rPr lang="zh-CN" altLang="en-US" smtClean="0"/>
-              <a:t>2024/5/13</a:t>
             </a:fld>
             <a:endParaRPr lang="zh-CN" altLang="en-US"/>
           </a:p>
@@ -2093,13 +1819,7 @@
       </p:sp>
       <p:sp>
         <p:nvSpPr>
-          <p:cNvPr id="3" name="页脚占位符 2">
-            <a:extLst>
-              <a:ext uri="{FF2B5EF4-FFF2-40B4-BE49-F238E27FC236}">
-                <a16:creationId xmlns:a16="http://schemas.microsoft.com/office/drawing/2014/main" id="{06720F4B-0D5F-F1C3-5AA9-89012236981D}"/>
-              </a:ext>
-            </a:extLst>
-          </p:cNvPr>
+          <p:cNvPr id="3" name="页脚占位符 2"/>
           <p:cNvSpPr>
             <a:spLocks noGrp="1"/>
           </p:cNvSpPr>
@@ -2118,13 +1838,7 @@
       </p:sp>
       <p:sp>
         <p:nvSpPr>
-          <p:cNvPr id="4" name="灯片编号占位符 3">
-            <a:extLst>
-              <a:ext uri="{FF2B5EF4-FFF2-40B4-BE49-F238E27FC236}">
-                <a16:creationId xmlns:a16="http://schemas.microsoft.com/office/drawing/2014/main" id="{6945BB65-3CF6-12C9-0F89-B23247AA3994}"/>
-              </a:ext>
-            </a:extLst>
-          </p:cNvPr>
+          <p:cNvPr id="4" name="灯片编号占位符 3"/>
           <p:cNvSpPr>
             <a:spLocks noGrp="1"/>
           </p:cNvSpPr>
@@ -2139,18 +1853,12 @@
           <a:p>
             <a:fld id="{DC94044A-7ABA-45EB-8F13-95CB6439284F}" type="slidenum">
               <a:rPr lang="zh-CN" altLang="en-US" smtClean="0"/>
-              <a:t>‹#›</a:t>
             </a:fld>
             <a:endParaRPr lang="zh-CN" altLang="en-US"/>
           </a:p>
         </p:txBody>
       </p:sp>
     </p:spTree>
-    <p:extLst>
-      <p:ext uri="{BB962C8B-B14F-4D97-AF65-F5344CB8AC3E}">
-        <p14:creationId xmlns:p14="http://schemas.microsoft.com/office/powerpoint/2010/main" val="1231026457"/>
-      </p:ext>
-    </p:extLst>
   </p:cSld>
   <p:clrMapOvr>
     <a:masterClrMapping/>
@@ -2177,13 +1885,7 @@
       </p:grpSpPr>
       <p:sp>
         <p:nvSpPr>
-          <p:cNvPr id="2" name="标题 1">
-            <a:extLst>
-              <a:ext uri="{FF2B5EF4-FFF2-40B4-BE49-F238E27FC236}">
-                <a16:creationId xmlns:a16="http://schemas.microsoft.com/office/drawing/2014/main" id="{BAC65B7A-E284-9A72-59B4-A639064D9ABB}"/>
-              </a:ext>
-            </a:extLst>
-          </p:cNvPr>
+          <p:cNvPr id="2" name="标题 1"/>
           <p:cNvSpPr>
             <a:spLocks noGrp="1"/>
           </p:cNvSpPr>
@@ -2209,18 +1911,13 @@
               <a:rPr lang="zh-CN" altLang="en-US"/>
               <a:t>单击此处编辑母版标题样式</a:t>
             </a:r>
-          </a:p>
-        </p:txBody>
-      </p:sp>
-      <p:sp>
-        <p:nvSpPr>
-          <p:cNvPr id="3" name="内容占位符 2">
-            <a:extLst>
-              <a:ext uri="{FF2B5EF4-FFF2-40B4-BE49-F238E27FC236}">
-                <a16:creationId xmlns:a16="http://schemas.microsoft.com/office/drawing/2014/main" id="{508D9E50-07CB-8532-0607-9C384A3B7B3A}"/>
-              </a:ext>
-            </a:extLst>
-          </p:cNvPr>
+            <a:endParaRPr lang="zh-CN" altLang="en-US"/>
+          </a:p>
+        </p:txBody>
+      </p:sp>
+      <p:sp>
+        <p:nvSpPr>
+          <p:cNvPr id="3" name="内容占位符 2"/>
           <p:cNvSpPr>
             <a:spLocks noGrp="1"/>
           </p:cNvSpPr>
@@ -2271,6 +1968,7 @@
               <a:rPr lang="zh-CN" altLang="en-US"/>
               <a:t>单击此处编辑母版文本样式</a:t>
             </a:r>
+            <a:endParaRPr lang="zh-CN" altLang="en-US"/>
           </a:p>
           <a:p>
             <a:pPr lvl="1"/>
@@ -2278,6 +1976,7 @@
               <a:rPr lang="zh-CN" altLang="en-US"/>
               <a:t>二级</a:t>
             </a:r>
+            <a:endParaRPr lang="zh-CN" altLang="en-US"/>
           </a:p>
           <a:p>
             <a:pPr lvl="2"/>
@@ -2285,6 +1984,7 @@
               <a:rPr lang="zh-CN" altLang="en-US"/>
               <a:t>三级</a:t>
             </a:r>
+            <a:endParaRPr lang="zh-CN" altLang="en-US"/>
           </a:p>
           <a:p>
             <a:pPr lvl="3"/>
@@ -2292,6 +1992,7 @@
               <a:rPr lang="zh-CN" altLang="en-US"/>
               <a:t>四级</a:t>
             </a:r>
+            <a:endParaRPr lang="zh-CN" altLang="en-US"/>
           </a:p>
           <a:p>
             <a:pPr lvl="4"/>
@@ -2299,18 +2000,13 @@
               <a:rPr lang="zh-CN" altLang="en-US"/>
               <a:t>五级</a:t>
             </a:r>
-          </a:p>
-        </p:txBody>
-      </p:sp>
-      <p:sp>
-        <p:nvSpPr>
-          <p:cNvPr id="4" name="文本占位符 3">
-            <a:extLst>
-              <a:ext uri="{FF2B5EF4-FFF2-40B4-BE49-F238E27FC236}">
-                <a16:creationId xmlns:a16="http://schemas.microsoft.com/office/drawing/2014/main" id="{64462028-B212-7878-8E41-5816FC8FBD5D}"/>
-              </a:ext>
-            </a:extLst>
-          </p:cNvPr>
+            <a:endParaRPr lang="zh-CN" altLang="en-US"/>
+          </a:p>
+        </p:txBody>
+      </p:sp>
+      <p:sp>
+        <p:nvSpPr>
+          <p:cNvPr id="4" name="文本占位符 3"/>
           <p:cNvSpPr>
             <a:spLocks noGrp="1"/>
           </p:cNvSpPr>
@@ -2370,18 +2066,13 @@
               <a:rPr lang="zh-CN" altLang="en-US"/>
               <a:t>单击此处编辑母版文本样式</a:t>
             </a:r>
-          </a:p>
-        </p:txBody>
-      </p:sp>
-      <p:sp>
-        <p:nvSpPr>
-          <p:cNvPr id="5" name="日期占位符 4">
-            <a:extLst>
-              <a:ext uri="{FF2B5EF4-FFF2-40B4-BE49-F238E27FC236}">
-                <a16:creationId xmlns:a16="http://schemas.microsoft.com/office/drawing/2014/main" id="{22E09707-FCDE-D799-0760-5763BDF310DE}"/>
-              </a:ext>
-            </a:extLst>
-          </p:cNvPr>
+            <a:endParaRPr lang="zh-CN" altLang="en-US"/>
+          </a:p>
+        </p:txBody>
+      </p:sp>
+      <p:sp>
+        <p:nvSpPr>
+          <p:cNvPr id="5" name="日期占位符 4"/>
           <p:cNvSpPr>
             <a:spLocks noGrp="1"/>
           </p:cNvSpPr>
@@ -2396,7 +2087,6 @@
           <a:p>
             <a:fld id="{5F436CC1-8A58-4025-8674-AC4643FC1143}" type="datetimeFigureOut">
               <a:rPr lang="zh-CN" altLang="en-US" smtClean="0"/>
-              <a:t>2024/5/13</a:t>
             </a:fld>
             <a:endParaRPr lang="zh-CN" altLang="en-US"/>
           </a:p>
@@ -2404,13 +2094,7 @@
       </p:sp>
       <p:sp>
         <p:nvSpPr>
-          <p:cNvPr id="6" name="页脚占位符 5">
-            <a:extLst>
-              <a:ext uri="{FF2B5EF4-FFF2-40B4-BE49-F238E27FC236}">
-                <a16:creationId xmlns:a16="http://schemas.microsoft.com/office/drawing/2014/main" id="{F62FE11D-2BE8-201F-AFCF-C0D77DAF5AC1}"/>
-              </a:ext>
-            </a:extLst>
-          </p:cNvPr>
+          <p:cNvPr id="6" name="页脚占位符 5"/>
           <p:cNvSpPr>
             <a:spLocks noGrp="1"/>
           </p:cNvSpPr>
@@ -2429,13 +2113,7 @@
       </p:sp>
       <p:sp>
         <p:nvSpPr>
-          <p:cNvPr id="7" name="灯片编号占位符 6">
-            <a:extLst>
-              <a:ext uri="{FF2B5EF4-FFF2-40B4-BE49-F238E27FC236}">
-                <a16:creationId xmlns:a16="http://schemas.microsoft.com/office/drawing/2014/main" id="{11BD1164-87AB-AE6B-0CF2-CB9DA31AECD9}"/>
-              </a:ext>
-            </a:extLst>
-          </p:cNvPr>
+          <p:cNvPr id="7" name="灯片编号占位符 6"/>
           <p:cNvSpPr>
             <a:spLocks noGrp="1"/>
           </p:cNvSpPr>
@@ -2450,18 +2128,12 @@
           <a:p>
             <a:fld id="{DC94044A-7ABA-45EB-8F13-95CB6439284F}" type="slidenum">
               <a:rPr lang="zh-CN" altLang="en-US" smtClean="0"/>
-              <a:t>‹#›</a:t>
             </a:fld>
             <a:endParaRPr lang="zh-CN" altLang="en-US"/>
           </a:p>
         </p:txBody>
       </p:sp>
     </p:spTree>
-    <p:extLst>
-      <p:ext uri="{BB962C8B-B14F-4D97-AF65-F5344CB8AC3E}">
-        <p14:creationId xmlns:p14="http://schemas.microsoft.com/office/powerpoint/2010/main" val="984792250"/>
-      </p:ext>
-    </p:extLst>
   </p:cSld>
   <p:clrMapOvr>
     <a:masterClrMapping/>
@@ -2488,13 +2160,7 @@
       </p:grpSpPr>
       <p:sp>
         <p:nvSpPr>
-          <p:cNvPr id="2" name="标题 1">
-            <a:extLst>
-              <a:ext uri="{FF2B5EF4-FFF2-40B4-BE49-F238E27FC236}">
-                <a16:creationId xmlns:a16="http://schemas.microsoft.com/office/drawing/2014/main" id="{96A223D0-95CC-D3D0-3FE0-15CD54FBF5F1}"/>
-              </a:ext>
-            </a:extLst>
-          </p:cNvPr>
+          <p:cNvPr id="2" name="标题 1"/>
           <p:cNvSpPr>
             <a:spLocks noGrp="1"/>
           </p:cNvSpPr>
@@ -2520,18 +2186,13 @@
               <a:rPr lang="zh-CN" altLang="en-US"/>
               <a:t>单击此处编辑母版标题样式</a:t>
             </a:r>
-          </a:p>
-        </p:txBody>
-      </p:sp>
-      <p:sp>
-        <p:nvSpPr>
-          <p:cNvPr id="3" name="图片占位符 2">
-            <a:extLst>
-              <a:ext uri="{FF2B5EF4-FFF2-40B4-BE49-F238E27FC236}">
-                <a16:creationId xmlns:a16="http://schemas.microsoft.com/office/drawing/2014/main" id="{55A07E46-8B53-773D-7E61-DEED1BF38A15}"/>
-              </a:ext>
-            </a:extLst>
-          </p:cNvPr>
+            <a:endParaRPr lang="zh-CN" altLang="en-US"/>
+          </a:p>
+        </p:txBody>
+      </p:sp>
+      <p:sp>
+        <p:nvSpPr>
+          <p:cNvPr id="3" name="图片占位符 2"/>
           <p:cNvSpPr>
             <a:spLocks noGrp="1"/>
           </p:cNvSpPr>
@@ -2592,13 +2253,7 @@
       </p:sp>
       <p:sp>
         <p:nvSpPr>
-          <p:cNvPr id="4" name="文本占位符 3">
-            <a:extLst>
-              <a:ext uri="{FF2B5EF4-FFF2-40B4-BE49-F238E27FC236}">
-                <a16:creationId xmlns:a16="http://schemas.microsoft.com/office/drawing/2014/main" id="{A76A8AF5-A3EA-DB81-F446-10D0C314C6B2}"/>
-              </a:ext>
-            </a:extLst>
-          </p:cNvPr>
+          <p:cNvPr id="4" name="文本占位符 3"/>
           <p:cNvSpPr>
             <a:spLocks noGrp="1"/>
           </p:cNvSpPr>
@@ -2658,18 +2313,13 @@
               <a:rPr lang="zh-CN" altLang="en-US"/>
               <a:t>单击此处编辑母版文本样式</a:t>
             </a:r>
-          </a:p>
-        </p:txBody>
-      </p:sp>
-      <p:sp>
-        <p:nvSpPr>
-          <p:cNvPr id="5" name="日期占位符 4">
-            <a:extLst>
-              <a:ext uri="{FF2B5EF4-FFF2-40B4-BE49-F238E27FC236}">
-                <a16:creationId xmlns:a16="http://schemas.microsoft.com/office/drawing/2014/main" id="{BF28D9BE-239B-3837-E361-12E8F5A363F1}"/>
-              </a:ext>
-            </a:extLst>
-          </p:cNvPr>
+            <a:endParaRPr lang="zh-CN" altLang="en-US"/>
+          </a:p>
+        </p:txBody>
+      </p:sp>
+      <p:sp>
+        <p:nvSpPr>
+          <p:cNvPr id="5" name="日期占位符 4"/>
           <p:cNvSpPr>
             <a:spLocks noGrp="1"/>
           </p:cNvSpPr>
@@ -2684,7 +2334,6 @@
           <a:p>
             <a:fld id="{5F436CC1-8A58-4025-8674-AC4643FC1143}" type="datetimeFigureOut">
               <a:rPr lang="zh-CN" altLang="en-US" smtClean="0"/>
-              <a:t>2024/5/13</a:t>
             </a:fld>
             <a:endParaRPr lang="zh-CN" altLang="en-US"/>
           </a:p>
@@ -2692,13 +2341,7 @@
       </p:sp>
       <p:sp>
         <p:nvSpPr>
-          <p:cNvPr id="6" name="页脚占位符 5">
-            <a:extLst>
-              <a:ext uri="{FF2B5EF4-FFF2-40B4-BE49-F238E27FC236}">
-                <a16:creationId xmlns:a16="http://schemas.microsoft.com/office/drawing/2014/main" id="{32F9AAA2-4CD9-9905-781F-C98D462E020B}"/>
-              </a:ext>
-            </a:extLst>
-          </p:cNvPr>
+          <p:cNvPr id="6" name="页脚占位符 5"/>
           <p:cNvSpPr>
             <a:spLocks noGrp="1"/>
           </p:cNvSpPr>
@@ -2717,13 +2360,7 @@
       </p:sp>
       <p:sp>
         <p:nvSpPr>
-          <p:cNvPr id="7" name="灯片编号占位符 6">
-            <a:extLst>
-              <a:ext uri="{FF2B5EF4-FFF2-40B4-BE49-F238E27FC236}">
-                <a16:creationId xmlns:a16="http://schemas.microsoft.com/office/drawing/2014/main" id="{4B604C98-95CF-D224-1DC4-ABAAE1207588}"/>
-              </a:ext>
-            </a:extLst>
-          </p:cNvPr>
+          <p:cNvPr id="7" name="灯片编号占位符 6"/>
           <p:cNvSpPr>
             <a:spLocks noGrp="1"/>
           </p:cNvSpPr>
@@ -2738,18 +2375,12 @@
           <a:p>
             <a:fld id="{DC94044A-7ABA-45EB-8F13-95CB6439284F}" type="slidenum">
               <a:rPr lang="zh-CN" altLang="en-US" smtClean="0"/>
-              <a:t>‹#›</a:t>
             </a:fld>
             <a:endParaRPr lang="zh-CN" altLang="en-US"/>
           </a:p>
         </p:txBody>
       </p:sp>
     </p:spTree>
-    <p:extLst>
-      <p:ext uri="{BB962C8B-B14F-4D97-AF65-F5344CB8AC3E}">
-        <p14:creationId xmlns:p14="http://schemas.microsoft.com/office/powerpoint/2010/main" val="2006995963"/>
-      </p:ext>
-    </p:extLst>
   </p:cSld>
   <p:clrMapOvr>
     <a:masterClrMapping/>
@@ -2781,13 +2412,7 @@
       </p:grpSpPr>
       <p:sp>
         <p:nvSpPr>
-          <p:cNvPr id="2" name="标题占位符 1">
-            <a:extLst>
-              <a:ext uri="{FF2B5EF4-FFF2-40B4-BE49-F238E27FC236}">
-                <a16:creationId xmlns:a16="http://schemas.microsoft.com/office/drawing/2014/main" id="{4E84ACAA-CD4F-31F6-0CE4-9AB7D17937B1}"/>
-              </a:ext>
-            </a:extLst>
-          </p:cNvPr>
+          <p:cNvPr id="2" name="标题占位符 1"/>
           <p:cNvSpPr>
             <a:spLocks noGrp="1"/>
           </p:cNvSpPr>
@@ -2814,18 +2439,13 @@
               <a:rPr lang="zh-CN" altLang="en-US"/>
               <a:t>单击此处编辑母版标题样式</a:t>
             </a:r>
-          </a:p>
-        </p:txBody>
-      </p:sp>
-      <p:sp>
-        <p:nvSpPr>
-          <p:cNvPr id="3" name="文本占位符 2">
-            <a:extLst>
-              <a:ext uri="{FF2B5EF4-FFF2-40B4-BE49-F238E27FC236}">
-                <a16:creationId xmlns:a16="http://schemas.microsoft.com/office/drawing/2014/main" id="{9825A305-F5BF-1504-C443-F3B32B8E21D4}"/>
-              </a:ext>
-            </a:extLst>
-          </p:cNvPr>
+            <a:endParaRPr lang="zh-CN" altLang="en-US"/>
+          </a:p>
+        </p:txBody>
+      </p:sp>
+      <p:sp>
+        <p:nvSpPr>
+          <p:cNvPr id="3" name="文本占位符 2"/>
           <p:cNvSpPr>
             <a:spLocks noGrp="1"/>
           </p:cNvSpPr>
@@ -2853,6 +2473,7 @@
               <a:rPr lang="zh-CN" altLang="en-US"/>
               <a:t>单击此处编辑母版文本样式</a:t>
             </a:r>
+            <a:endParaRPr lang="zh-CN" altLang="en-US"/>
           </a:p>
           <a:p>
             <a:pPr lvl="1"/>
@@ -2860,6 +2481,7 @@
               <a:rPr lang="zh-CN" altLang="en-US"/>
               <a:t>二级</a:t>
             </a:r>
+            <a:endParaRPr lang="zh-CN" altLang="en-US"/>
           </a:p>
           <a:p>
             <a:pPr lvl="2"/>
@@ -2867,6 +2489,7 @@
               <a:rPr lang="zh-CN" altLang="en-US"/>
               <a:t>三级</a:t>
             </a:r>
+            <a:endParaRPr lang="zh-CN" altLang="en-US"/>
           </a:p>
           <a:p>
             <a:pPr lvl="3"/>
@@ -2874,6 +2497,7 @@
               <a:rPr lang="zh-CN" altLang="en-US"/>
               <a:t>四级</a:t>
             </a:r>
+            <a:endParaRPr lang="zh-CN" altLang="en-US"/>
           </a:p>
           <a:p>
             <a:pPr lvl="4"/>
@@ -2881,18 +2505,13 @@
               <a:rPr lang="zh-CN" altLang="en-US"/>
               <a:t>五级</a:t>
             </a:r>
-          </a:p>
-        </p:txBody>
-      </p:sp>
-      <p:sp>
-        <p:nvSpPr>
-          <p:cNvPr id="4" name="日期占位符 3">
-            <a:extLst>
-              <a:ext uri="{FF2B5EF4-FFF2-40B4-BE49-F238E27FC236}">
-                <a16:creationId xmlns:a16="http://schemas.microsoft.com/office/drawing/2014/main" id="{9A429397-836D-4DAD-0C16-37ACCE808E8A}"/>
-              </a:ext>
-            </a:extLst>
-          </p:cNvPr>
+            <a:endParaRPr lang="zh-CN" altLang="en-US"/>
+          </a:p>
+        </p:txBody>
+      </p:sp>
+      <p:sp>
+        <p:nvSpPr>
+          <p:cNvPr id="4" name="日期占位符 3"/>
           <p:cNvSpPr>
             <a:spLocks noGrp="1"/>
           </p:cNvSpPr>
@@ -2925,7 +2544,6 @@
           <a:p>
             <a:fld id="{5F436CC1-8A58-4025-8674-AC4643FC1143}" type="datetimeFigureOut">
               <a:rPr lang="zh-CN" altLang="en-US" smtClean="0"/>
-              <a:t>2024/5/13</a:t>
             </a:fld>
             <a:endParaRPr lang="zh-CN" altLang="en-US"/>
           </a:p>
@@ -2933,13 +2551,7 @@
       </p:sp>
       <p:sp>
         <p:nvSpPr>
-          <p:cNvPr id="5" name="页脚占位符 4">
-            <a:extLst>
-              <a:ext uri="{FF2B5EF4-FFF2-40B4-BE49-F238E27FC236}">
-                <a16:creationId xmlns:a16="http://schemas.microsoft.com/office/drawing/2014/main" id="{A1AC1DDB-EAE2-E5DB-E682-1EAD44472B00}"/>
-              </a:ext>
-            </a:extLst>
-          </p:cNvPr>
+          <p:cNvPr id="5" name="页脚占位符 4"/>
           <p:cNvSpPr>
             <a:spLocks noGrp="1"/>
           </p:cNvSpPr>
@@ -2976,13 +2588,7 @@
       </p:sp>
       <p:sp>
         <p:nvSpPr>
-          <p:cNvPr id="6" name="灯片编号占位符 5">
-            <a:extLst>
-              <a:ext uri="{FF2B5EF4-FFF2-40B4-BE49-F238E27FC236}">
-                <a16:creationId xmlns:a16="http://schemas.microsoft.com/office/drawing/2014/main" id="{ACB4042B-AA3E-7214-B3EB-9EE828C1549E}"/>
-              </a:ext>
-            </a:extLst>
-          </p:cNvPr>
+          <p:cNvPr id="6" name="灯片编号占位符 5"/>
           <p:cNvSpPr>
             <a:spLocks noGrp="1"/>
           </p:cNvSpPr>
@@ -3015,18 +2621,12 @@
           <a:p>
             <a:fld id="{DC94044A-7ABA-45EB-8F13-95CB6439284F}" type="slidenum">
               <a:rPr lang="zh-CN" altLang="en-US" smtClean="0"/>
-              <a:t>‹#›</a:t>
             </a:fld>
             <a:endParaRPr lang="zh-CN" altLang="en-US"/>
           </a:p>
         </p:txBody>
       </p:sp>
     </p:spTree>
-    <p:extLst>
-      <p:ext uri="{BB962C8B-B14F-4D97-AF65-F5344CB8AC3E}">
-        <p14:creationId xmlns:p14="http://schemas.microsoft.com/office/powerpoint/2010/main" val="185903762"/>
-      </p:ext>
-    </p:extLst>
   </p:cSld>
   <p:clrMap bg1="lt1" tx1="dk1" bg2="lt2" tx2="dk2" accent1="accent1" accent2="accent2" accent3="accent3" accent4="accent4" accent5="accent5" accent6="accent6" hlink="hlink" folHlink="folHlink"/>
   <p:sldLayoutIdLst>
@@ -3070,7 +2670,7 @@
         <a:spcBef>
           <a:spcPts val="1000"/>
         </a:spcBef>
-        <a:buFont typeface="Arial" panose="020B0604020202020204" pitchFamily="34" charset="0"/>
+        <a:buFont typeface="Arial" panose="020B0604020202090204" pitchFamily="34" charset="0"/>
         <a:buChar char="•"/>
         <a:defRPr sz="2800" kern="1200">
           <a:solidFill>
@@ -3088,7 +2688,7 @@
         <a:spcBef>
           <a:spcPts val="500"/>
         </a:spcBef>
-        <a:buFont typeface="Arial" panose="020B0604020202020204" pitchFamily="34" charset="0"/>
+        <a:buFont typeface="Arial" panose="020B0604020202090204" pitchFamily="34" charset="0"/>
         <a:buChar char="•"/>
         <a:defRPr sz="2400" kern="1200">
           <a:solidFill>
@@ -3106,7 +2706,7 @@
         <a:spcBef>
           <a:spcPts val="500"/>
         </a:spcBef>
-        <a:buFont typeface="Arial" panose="020B0604020202020204" pitchFamily="34" charset="0"/>
+        <a:buFont typeface="Arial" panose="020B0604020202090204" pitchFamily="34" charset="0"/>
         <a:buChar char="•"/>
         <a:defRPr sz="2000" kern="1200">
           <a:solidFill>
@@ -3124,7 +2724,7 @@
         <a:spcBef>
           <a:spcPts val="500"/>
         </a:spcBef>
-        <a:buFont typeface="Arial" panose="020B0604020202020204" pitchFamily="34" charset="0"/>
+        <a:buFont typeface="Arial" panose="020B0604020202090204" pitchFamily="34" charset="0"/>
         <a:buChar char="•"/>
         <a:defRPr sz="1800" kern="1200">
           <a:solidFill>
@@ -3142,7 +2742,7 @@
         <a:spcBef>
           <a:spcPts val="500"/>
         </a:spcBef>
-        <a:buFont typeface="Arial" panose="020B0604020202020204" pitchFamily="34" charset="0"/>
+        <a:buFont typeface="Arial" panose="020B0604020202090204" pitchFamily="34" charset="0"/>
         <a:buChar char="•"/>
         <a:defRPr sz="1800" kern="1200">
           <a:solidFill>
@@ -3160,7 +2760,7 @@
         <a:spcBef>
           <a:spcPts val="500"/>
         </a:spcBef>
-        <a:buFont typeface="Arial" panose="020B0604020202020204" pitchFamily="34" charset="0"/>
+        <a:buFont typeface="Arial" panose="020B0604020202090204" pitchFamily="34" charset="0"/>
         <a:buChar char="•"/>
         <a:defRPr sz="1800" kern="1200">
           <a:solidFill>
@@ -3178,7 +2778,7 @@
         <a:spcBef>
           <a:spcPts val="500"/>
         </a:spcBef>
-        <a:buFont typeface="Arial" panose="020B0604020202020204" pitchFamily="34" charset="0"/>
+        <a:buFont typeface="Arial" panose="020B0604020202090204" pitchFamily="34" charset="0"/>
         <a:buChar char="•"/>
         <a:defRPr sz="1800" kern="1200">
           <a:solidFill>
@@ -3196,7 +2796,7 @@
         <a:spcBef>
           <a:spcPts val="500"/>
         </a:spcBef>
-        <a:buFont typeface="Arial" panose="020B0604020202020204" pitchFamily="34" charset="0"/>
+        <a:buFont typeface="Arial" panose="020B0604020202090204" pitchFamily="34" charset="0"/>
         <a:buChar char="•"/>
         <a:defRPr sz="1800" kern="1200">
           <a:solidFill>
@@ -3214,7 +2814,7 @@
         <a:spcBef>
           <a:spcPts val="500"/>
         </a:spcBef>
-        <a:buFont typeface="Arial" panose="020B0604020202020204" pitchFamily="34" charset="0"/>
+        <a:buFont typeface="Arial" panose="020B0604020202090204" pitchFamily="34" charset="0"/>
         <a:buChar char="•"/>
         <a:defRPr sz="1800" kern="1200">
           <a:solidFill>
@@ -3344,13 +2944,7 @@
       </p:grpSpPr>
       <p:sp>
         <p:nvSpPr>
-          <p:cNvPr id="3" name="内容占位符 2">
-            <a:extLst>
-              <a:ext uri="{FF2B5EF4-FFF2-40B4-BE49-F238E27FC236}">
-                <a16:creationId xmlns:a16="http://schemas.microsoft.com/office/drawing/2014/main" id="{2A5B09C6-B8EC-A0C8-23EF-448E6308F2BC}"/>
-              </a:ext>
-            </a:extLst>
-          </p:cNvPr>
+          <p:cNvPr id="3" name="内容占位符 2"/>
           <p:cNvSpPr>
             <a:spLocks noGrp="1"/>
           </p:cNvSpPr>
@@ -3464,6 +3058,7 @@
               <a:rPr lang="zh-CN" altLang="en-US" dirty="0"/>
               <a:t>严重依赖于预测，预测失败会导致后续同步产生严重后果</a:t>
             </a:r>
+            <a:endParaRPr lang="zh-CN" altLang="en-US" dirty="0"/>
           </a:p>
           <a:p>
             <a:r>
@@ -3506,15 +3101,11 @@
               <a:rPr lang="zh-CN" altLang="en-US" dirty="0"/>
               <a:t>的一部分</a:t>
             </a:r>
+            <a:endParaRPr lang="zh-CN" altLang="en-US" dirty="0"/>
           </a:p>
         </p:txBody>
       </p:sp>
     </p:spTree>
-    <p:extLst>
-      <p:ext uri="{BB962C8B-B14F-4D97-AF65-F5344CB8AC3E}">
-        <p14:creationId xmlns:p14="http://schemas.microsoft.com/office/powerpoint/2010/main" val="2653087655"/>
-      </p:ext>
-    </p:extLst>
   </p:cSld>
   <p:clrMapOvr>
     <a:masterClrMapping/>
@@ -3541,13 +3132,7 @@
       </p:grpSpPr>
       <p:sp>
         <p:nvSpPr>
-          <p:cNvPr id="3" name="内容占位符 2">
-            <a:extLst>
-              <a:ext uri="{FF2B5EF4-FFF2-40B4-BE49-F238E27FC236}">
-                <a16:creationId xmlns:a16="http://schemas.microsoft.com/office/drawing/2014/main" id="{2A5B09C6-B8EC-A0C8-23EF-448E6308F2BC}"/>
-              </a:ext>
-            </a:extLst>
-          </p:cNvPr>
+          <p:cNvPr id="3" name="内容占位符 2"/>
           <p:cNvSpPr>
             <a:spLocks noGrp="1"/>
           </p:cNvSpPr>
@@ -3595,7 +3180,11 @@
             <a:pPr lvl="1"/>
             <a:r>
               <a:rPr lang="zh-CN" altLang="en-US" dirty="0"/>
-              <a:t>直到每个队列都具有消息，则分别选择队列里时间戳最大的作为基础消息</a:t>
+              <a:t>直到每个队列都具有消息，则选择</a:t>
+            </a:r>
+            <a:r>
+              <a:rPr lang="zh-CN" altLang="en-US" dirty="0"/>
+              <a:t>所有队列里时间戳最大的作为基础消息</a:t>
             </a:r>
             <a:endParaRPr lang="en-US" altLang="zh-CN" dirty="0"/>
           </a:p>
@@ -3621,25 +3210,20 @@
               <a:rPr lang="zh-CN" altLang="en-US" dirty="0"/>
               <a:t>如果输出集合里包括来自所有队列的消息，整合消息并输出，之后把待选集合中基础消息之前的都移除。输出集合不包含所有队列，等待到满足为止</a:t>
             </a:r>
+            <a:endParaRPr lang="zh-CN" altLang="en-US" dirty="0"/>
           </a:p>
         </p:txBody>
       </p:sp>
       <p:pic>
         <p:nvPicPr>
-          <p:cNvPr id="5" name="图片 4">
-            <a:extLst>
-              <a:ext uri="{FF2B5EF4-FFF2-40B4-BE49-F238E27FC236}">
-                <a16:creationId xmlns:a16="http://schemas.microsoft.com/office/drawing/2014/main" id="{E099789F-C81C-F7C6-5A6C-51E0FC173B4E}"/>
-              </a:ext>
-            </a:extLst>
-          </p:cNvPr>
+          <p:cNvPr id="5" name="图片 4"/>
           <p:cNvPicPr>
             <a:picLocks noChangeAspect="1"/>
           </p:cNvPicPr>
           <p:nvPr/>
         </p:nvPicPr>
         <p:blipFill>
-          <a:blip r:embed="rId2"/>
+          <a:blip r:embed="rId1"/>
           <a:stretch>
             <a:fillRect/>
           </a:stretch>
@@ -3655,11 +3239,6 @@
         </p:spPr>
       </p:pic>
     </p:spTree>
-    <p:extLst>
-      <p:ext uri="{BB962C8B-B14F-4D97-AF65-F5344CB8AC3E}">
-        <p14:creationId xmlns:p14="http://schemas.microsoft.com/office/powerpoint/2010/main" val="395299576"/>
-      </p:ext>
-    </p:extLst>
   </p:cSld>
   <p:clrMapOvr>
     <a:masterClrMapping/>
@@ -3686,13 +3265,7 @@
       </p:grpSpPr>
       <p:sp>
         <p:nvSpPr>
-          <p:cNvPr id="3" name="内容占位符 2">
-            <a:extLst>
-              <a:ext uri="{FF2B5EF4-FFF2-40B4-BE49-F238E27FC236}">
-                <a16:creationId xmlns:a16="http://schemas.microsoft.com/office/drawing/2014/main" id="{2A5B09C6-B8EC-A0C8-23EF-448E6308F2BC}"/>
-              </a:ext>
-            </a:extLst>
-          </p:cNvPr>
+          <p:cNvPr id="3" name="内容占位符 2"/>
           <p:cNvSpPr>
             <a:spLocks noGrp="1"/>
           </p:cNvSpPr>
@@ -3811,15 +3384,11 @@
               <a:rPr lang="zh-CN" altLang="en-US" dirty="0"/>
               <a:t>，任务片段不需要同步执行）更好利用资源，但实现复杂，考虑如何在处理器之间分配。</a:t>
             </a:r>
+            <a:endParaRPr lang="zh-CN" altLang="en-US" dirty="0"/>
           </a:p>
         </p:txBody>
       </p:sp>
     </p:spTree>
-    <p:extLst>
-      <p:ext uri="{BB962C8B-B14F-4D97-AF65-F5344CB8AC3E}">
-        <p14:creationId xmlns:p14="http://schemas.microsoft.com/office/powerpoint/2010/main" val="317125576"/>
-      </p:ext>
-    </p:extLst>
   </p:cSld>
   <p:clrMapOvr>
     <a:masterClrMapping/>
@@ -3846,13 +3415,7 @@
       </p:grpSpPr>
       <p:sp>
         <p:nvSpPr>
-          <p:cNvPr id="3" name="内容占位符 2">
-            <a:extLst>
-              <a:ext uri="{FF2B5EF4-FFF2-40B4-BE49-F238E27FC236}">
-                <a16:creationId xmlns:a16="http://schemas.microsoft.com/office/drawing/2014/main" id="{2A5B09C6-B8EC-A0C8-23EF-448E6308F2BC}"/>
-              </a:ext>
-            </a:extLst>
-          </p:cNvPr>
+          <p:cNvPr id="3" name="内容占位符 2"/>
           <p:cNvSpPr>
             <a:spLocks noGrp="1"/>
           </p:cNvSpPr>
@@ -3874,6 +3437,7 @@
               <a:rPr lang="en-US" altLang="zh-CN" dirty="0"/>
               <a:t>Real-Time Scheduling of Autonomous Driving System with Guaranteed Timing Correctness</a:t>
             </a:r>
+            <a:endParaRPr lang="en-US" altLang="zh-CN" dirty="0"/>
           </a:p>
           <a:p>
             <a:r>
@@ -3973,15 +3537,11 @@
               <a:rPr lang="zh-CN" altLang="en-US" dirty="0"/>
               <a:t>减少不必要的工作负载、任务集可调度性和端到端时序，不满足的迭代将被增加约束条件</a:t>
             </a:r>
+            <a:endParaRPr lang="zh-CN" altLang="en-US" dirty="0"/>
           </a:p>
         </p:txBody>
       </p:sp>
     </p:spTree>
-    <p:extLst>
-      <p:ext uri="{BB962C8B-B14F-4D97-AF65-F5344CB8AC3E}">
-        <p14:creationId xmlns:p14="http://schemas.microsoft.com/office/powerpoint/2010/main" val="4156391247"/>
-      </p:ext>
-    </p:extLst>
   </p:cSld>
   <p:clrMapOvr>
     <a:masterClrMapping/>
@@ -4008,13 +3568,7 @@
       </p:grpSpPr>
       <p:sp>
         <p:nvSpPr>
-          <p:cNvPr id="3" name="内容占位符 2">
-            <a:extLst>
-              <a:ext uri="{FF2B5EF4-FFF2-40B4-BE49-F238E27FC236}">
-                <a16:creationId xmlns:a16="http://schemas.microsoft.com/office/drawing/2014/main" id="{2A5B09C6-B8EC-A0C8-23EF-448E6308F2BC}"/>
-              </a:ext>
-            </a:extLst>
-          </p:cNvPr>
+          <p:cNvPr id="3" name="内容占位符 2"/>
           <p:cNvSpPr>
             <a:spLocks noGrp="1"/>
           </p:cNvSpPr>
@@ -4038,6 +3592,7 @@
               <a:rPr lang="en-US" altLang="zh-CN" dirty="0"/>
               <a:t>Bounding the Response Time of DAG Tasks Using Long </a:t>
             </a:r>
+            <a:endParaRPr lang="en-US" altLang="zh-CN" dirty="0"/>
           </a:p>
           <a:p>
             <a:r>
@@ -4113,15 +3668,11 @@
               <a:rPr lang="zh-CN" altLang="en-US" dirty="0"/>
               <a:t>针对给定的执行序列通过特定的规则选择的一组顶点序列</a:t>
             </a:r>
+            <a:endParaRPr lang="zh-CN" altLang="en-US" dirty="0"/>
           </a:p>
         </p:txBody>
       </p:sp>
     </p:spTree>
-    <p:extLst>
-      <p:ext uri="{BB962C8B-B14F-4D97-AF65-F5344CB8AC3E}">
-        <p14:creationId xmlns:p14="http://schemas.microsoft.com/office/powerpoint/2010/main" val="21637461"/>
-      </p:ext>
-    </p:extLst>
   </p:cSld>
   <p:clrMapOvr>
     <a:masterClrMapping/>
@@ -4148,13 +3699,7 @@
       </p:grpSpPr>
       <p:sp>
         <p:nvSpPr>
-          <p:cNvPr id="3" name="内容占位符 2">
-            <a:extLst>
-              <a:ext uri="{FF2B5EF4-FFF2-40B4-BE49-F238E27FC236}">
-                <a16:creationId xmlns:a16="http://schemas.microsoft.com/office/drawing/2014/main" id="{2A5B09C6-B8EC-A0C8-23EF-448E6308F2BC}"/>
-              </a:ext>
-            </a:extLst>
-          </p:cNvPr>
+          <p:cNvPr id="3" name="内容占位符 2"/>
           <p:cNvSpPr>
             <a:spLocks noGrp="1"/>
           </p:cNvSpPr>
@@ -4178,6 +3723,7 @@
               <a:rPr lang="en-US" altLang="zh-CN" dirty="0"/>
               <a:t>Minimizing Probabilistic End-to-end Latencies of Autonomous Driving </a:t>
             </a:r>
+            <a:endParaRPr lang="en-US" altLang="zh-CN" dirty="0"/>
           </a:p>
           <a:p>
             <a:r>
@@ -4298,11 +3844,6 @@
         </p:txBody>
       </p:sp>
     </p:spTree>
-    <p:extLst>
-      <p:ext uri="{BB962C8B-B14F-4D97-AF65-F5344CB8AC3E}">
-        <p14:creationId xmlns:p14="http://schemas.microsoft.com/office/powerpoint/2010/main" val="2279364020"/>
-      </p:ext>
-    </p:extLst>
   </p:cSld>
   <p:clrMapOvr>
     <a:masterClrMapping/>
@@ -4353,7 +3894,7 @@
     </a:clrScheme>
     <a:fontScheme name="Office">
       <a:majorFont>
-        <a:latin typeface="等线 Light" panose="020F0302020204030204"/>
+        <a:latin typeface="等线 Light"/>
         <a:ea typeface=""/>
         <a:cs typeface=""/>
         <a:font script="Jpan" typeface="游ゴシック Light"/>
@@ -4386,26 +3927,9 @@
         <a:font script="Viet" typeface="Times New Roman"/>
         <a:font script="Uigh" typeface="Microsoft Uighur"/>
         <a:font script="Geor" typeface="Sylfaen"/>
-        <a:font script="Armn" typeface="Arial"/>
-        <a:font script="Bugi" typeface="Leelawadee UI"/>
-        <a:font script="Bopo" typeface="Microsoft JhengHei"/>
-        <a:font script="Java" typeface="Javanese Text"/>
-        <a:font script="Lisu" typeface="Segoe UI"/>
-        <a:font script="Mymr" typeface="Myanmar Text"/>
-        <a:font script="Nkoo" typeface="Ebrima"/>
-        <a:font script="Olck" typeface="Nirmala UI"/>
-        <a:font script="Osma" typeface="Ebrima"/>
-        <a:font script="Phag" typeface="Phagspa"/>
-        <a:font script="Syrn" typeface="Estrangelo Edessa"/>
-        <a:font script="Syrj" typeface="Estrangelo Edessa"/>
-        <a:font script="Syre" typeface="Estrangelo Edessa"/>
-        <a:font script="Sora" typeface="Nirmala UI"/>
-        <a:font script="Tale" typeface="Microsoft Tai Le"/>
-        <a:font script="Talu" typeface="Microsoft New Tai Lue"/>
-        <a:font script="Tfng" typeface="Ebrima"/>
       </a:majorFont>
       <a:minorFont>
-        <a:latin typeface="等线" panose="020F0502020204030204"/>
+        <a:latin typeface="等线"/>
         <a:ea typeface=""/>
         <a:cs typeface=""/>
         <a:font script="Jpan" typeface="游ゴシック"/>
@@ -4438,23 +3962,6 @@
         <a:font script="Viet" typeface="Arial"/>
         <a:font script="Uigh" typeface="Microsoft Uighur"/>
         <a:font script="Geor" typeface="Sylfaen"/>
-        <a:font script="Armn" typeface="Arial"/>
-        <a:font script="Bugi" typeface="Leelawadee UI"/>
-        <a:font script="Bopo" typeface="Microsoft JhengHei"/>
-        <a:font script="Java" typeface="Javanese Text"/>
-        <a:font script="Lisu" typeface="Segoe UI"/>
-        <a:font script="Mymr" typeface="Myanmar Text"/>
-        <a:font script="Nkoo" typeface="Ebrima"/>
-        <a:font script="Olck" typeface="Nirmala UI"/>
-        <a:font script="Osma" typeface="Ebrima"/>
-        <a:font script="Phag" typeface="Phagspa"/>
-        <a:font script="Syrn" typeface="Estrangelo Edessa"/>
-        <a:font script="Syrj" typeface="Estrangelo Edessa"/>
-        <a:font script="Syre" typeface="Estrangelo Edessa"/>
-        <a:font script="Sora" typeface="Nirmala UI"/>
-        <a:font script="Tale" typeface="Microsoft Tai Le"/>
-        <a:font script="Talu" typeface="Microsoft New Tai Lue"/>
-        <a:font script="Tfng" typeface="Ebrima"/>
       </a:minorFont>
     </a:fontScheme>
     <a:fmtScheme name="Office">
@@ -4595,8 +4102,6 @@
       </a:bgFillStyleLst>
     </a:fmtScheme>
   </a:themeElements>
-  <a:objectDefaults/>
-  <a:extraClrSchemeLst/>
   <a:extLst>
     <a:ext uri="{05A4C25C-085E-4340-85A3-A5531E510DB2}">
       <thm15:themeFamily xmlns:thm15="http://schemas.microsoft.com/office/thememl/2012/main" name="Office Theme" id="{62F939B6-93AF-4DB8-9C6B-D6C7DFDC589F}" vid="{4A3C46E8-61CC-4603-A589-7422A47A8E4A}"/>

</xml_diff>

<commit_message>
vault backup: 2024-05-14 13:16:36
</commit_message>
<xml_diff>
--- a/06-ppt/discussion/0514 - 副本.pptx
+++ b/06-ppt/discussion/0514 - 副本.pptx
@@ -3212,6 +3212,34 @@
             </a:r>
             <a:endParaRPr lang="zh-CN" altLang="en-US" dirty="0"/>
           </a:p>
+          <a:p>
+            <a:pPr lvl="1"/>
+            <a:endParaRPr lang="zh-CN" altLang="en-US" dirty="0"/>
+          </a:p>
+          <a:p>
+            <a:pPr lvl="1"/>
+            <a:endParaRPr lang="zh-CN" altLang="en-US" dirty="0"/>
+          </a:p>
+          <a:p>
+            <a:pPr lvl="1"/>
+            <a:r>
+              <a:rPr lang="zh-CN" altLang="en-US" dirty="0"/>
+              <a:t>消息在采样时间和到达通道时间之间可能会存在延迟。对于每个设置中的实验，消息所经历的延迟在 1 毫秒到 40 毫秒之间随机变化。</a:t>
+            </a:r>
+            <a:endParaRPr lang="zh-CN" altLang="en-US" dirty="0"/>
+          </a:p>
+          <a:p>
+            <a:pPr lvl="1"/>
+            <a:endParaRPr lang="zh-CN" altLang="en-US" dirty="0"/>
+          </a:p>
+          <a:p>
+            <a:pPr lvl="1"/>
+            <a:r>
+              <a:rPr lang="zh-CN" altLang="en-US" dirty="0"/>
+              <a:t>随着抖动比α的增加，两个消息同步器的成功率均下降。这是因为&lt;span style="color:black;background:#FFDBBB !important;"&gt;较大的抖动比意味着消息到达的时间晚于预期到达时间&lt;/span&gt;。这种延迟导致固定时间间隔内可用的消息较少，从而导致生成有效消息集的成功率较低。</a:t>
+            </a:r>
+            <a:endParaRPr lang="zh-CN" altLang="en-US" dirty="0"/>
+          </a:p>
         </p:txBody>
       </p:sp>
       <p:pic>
@@ -3230,8 +3258,36 @@
         </p:blipFill>
         <p:spPr>
           <a:xfrm>
-            <a:off x="3580154" y="3425972"/>
+            <a:off x="4621554" y="-56368"/>
             <a:ext cx="5036308" cy="3305076"/>
+          </a:xfrm>
+          <a:prstGeom prst="rect">
+            <a:avLst/>
+          </a:prstGeom>
+        </p:spPr>
+      </p:pic>
+      <p:pic>
+        <p:nvPicPr>
+          <p:cNvPr id="2" name="图片 1"/>
+          <p:cNvPicPr>
+            <a:picLocks noChangeAspect="1"/>
+          </p:cNvPicPr>
+          <p:nvPr>
+            <p:custDataLst>
+              <p:tags r:id="rId2"/>
+            </p:custDataLst>
+          </p:nvPr>
+        </p:nvPicPr>
+        <p:blipFill>
+          <a:blip r:embed="rId3"/>
+          <a:stretch>
+            <a:fillRect/>
+          </a:stretch>
+        </p:blipFill>
+        <p:spPr>
+          <a:xfrm>
+            <a:off x="-389255" y="-516255"/>
+            <a:ext cx="4664075" cy="3006725"/>
           </a:xfrm>
           <a:prstGeom prst="rect">
             <a:avLst/>
@@ -3849,6 +3905,12 @@
     <a:masterClrMapping/>
   </p:clrMapOvr>
 </p:sld>
+</file>
+
+<file path=ppt/tags/tag1.xml><?xml version="1.0" encoding="utf-8"?>
+<p:tagLst xmlns:p="http://schemas.openxmlformats.org/presentationml/2006/main">
+  <p:tag name="KSO_WM_BEAUTIFY_FLAG" val=""/>
+</p:tagLst>
 </file>
 
 <file path=ppt/theme/theme1.xml><?xml version="1.0" encoding="utf-8"?>

</xml_diff>